<commit_message>
week 9/10: fix slide typos
</commit_message>
<xml_diff>
--- a/week_09_10/week_09_10.pptx
+++ b/week_09_10/week_09_10.pptx
@@ -214,7 +214,7 @@
           <a:p>
             <a:fld id="{A756DEA0-F944-5946-9B95-BC7B5255CD05}" type="datetimeFigureOut">
               <a:rPr lang="en-US" smtClean="0"/>
-              <a:t>3/29/16</a:t>
+              <a:t>4/2/16</a:t>
             </a:fld>
             <a:endParaRPr lang="en-US"/>
           </a:p>
@@ -986,7 +986,7 @@
           <a:p>
             <a:fld id="{9E016143-E03C-4CFD-AFDC-14E5BDEA754C}" type="datetimeFigureOut">
               <a:rPr lang="en-US" dirty="0"/>
-              <a:t>3/29/16</a:t>
+              <a:t>4/2/16</a:t>
             </a:fld>
             <a:endParaRPr lang="en-US" dirty="0"/>
           </a:p>
@@ -1210,7 +1210,7 @@
           <a:p>
             <a:fld id="{C033E54A-A8CA-48C1-9504-691B58049D29}" type="datetimeFigureOut">
               <a:rPr lang="en-US" dirty="0"/>
-              <a:t>3/29/16</a:t>
+              <a:t>4/2/16</a:t>
             </a:fld>
             <a:endParaRPr lang="en-US" dirty="0"/>
           </a:p>
@@ -1385,7 +1385,7 @@
           <a:p>
             <a:fld id="{B5F6C806-BBF7-471C-9527-881CE2266695}" type="datetimeFigureOut">
               <a:rPr lang="en-US" dirty="0"/>
-              <a:t>3/29/16</a:t>
+              <a:t>4/2/16</a:t>
             </a:fld>
             <a:endParaRPr lang="en-US" dirty="0"/>
           </a:p>
@@ -1550,7 +1550,7 @@
           <a:p>
             <a:fld id="{78C94063-DF36-4330-A365-08DA1FA5B7D6}" type="datetimeFigureOut">
               <a:rPr lang="en-US" dirty="0"/>
-              <a:t>3/29/16</a:t>
+              <a:t>4/2/16</a:t>
             </a:fld>
             <a:endParaRPr lang="en-US" dirty="0"/>
           </a:p>
@@ -1799,7 +1799,7 @@
           <a:p>
             <a:fld id="{908A7C6C-0F39-4D70-8E8D-FE5B9C95FA73}" type="datetimeFigureOut">
               <a:rPr lang="en-US" dirty="0"/>
-              <a:t>3/29/16</a:t>
+              <a:t>4/2/16</a:t>
             </a:fld>
             <a:endParaRPr lang="en-US" dirty="0"/>
           </a:p>
@@ -2120,7 +2120,7 @@
           <a:p>
             <a:fld id="{DFCFA4AC-08CC-42CE-BD01-C191750A04EC}" type="datetimeFigureOut">
               <a:rPr lang="en-US" dirty="0"/>
-              <a:t>3/29/16</a:t>
+              <a:t>4/2/16</a:t>
             </a:fld>
             <a:endParaRPr lang="en-US" dirty="0"/>
           </a:p>
@@ -2566,7 +2566,7 @@
           <a:p>
             <a:fld id="{1BA7A723-92A7-435B-B681-F25B092FEFEB}" type="datetimeFigureOut">
               <a:rPr lang="en-US" dirty="0"/>
-              <a:t>3/29/16</a:t>
+              <a:t>4/2/16</a:t>
             </a:fld>
             <a:endParaRPr lang="en-US" dirty="0"/>
           </a:p>
@@ -2679,7 +2679,7 @@
           <a:p>
             <a:fld id="{4F170639-886C-4FCF-9EAB-ABB5DA3F3F4A}" type="datetimeFigureOut">
               <a:rPr lang="en-US" dirty="0"/>
-              <a:t>3/29/16</a:t>
+              <a:t>4/2/16</a:t>
             </a:fld>
             <a:endParaRPr lang="en-US" dirty="0"/>
           </a:p>
@@ -2769,7 +2769,7 @@
           <a:p>
             <a:fld id="{22230651-31F4-45D2-98AE-A2108F41BC07}" type="datetimeFigureOut">
               <a:rPr lang="en-US" dirty="0"/>
-              <a:t>3/29/16</a:t>
+              <a:t>4/2/16</a:t>
             </a:fld>
             <a:endParaRPr lang="en-US" dirty="0"/>
           </a:p>
@@ -3051,7 +3051,7 @@
           <a:p>
             <a:fld id="{6F53789A-C914-4DB1-8815-80B5EC7335C5}" type="datetimeFigureOut">
               <a:rPr lang="en-US" dirty="0"/>
-              <a:t>3/29/16</a:t>
+              <a:t>4/2/16</a:t>
             </a:fld>
             <a:endParaRPr lang="en-US" dirty="0"/>
           </a:p>
@@ -3371,7 +3371,7 @@
           <a:p>
             <a:fld id="{5E6440AA-91A0-436F-8FDB-C0F939DCAE21}" type="datetimeFigureOut">
               <a:rPr lang="en-US" dirty="0"/>
-              <a:t>3/29/16</a:t>
+              <a:t>4/2/16</a:t>
             </a:fld>
             <a:endParaRPr lang="en-US" dirty="0"/>
           </a:p>
@@ -3620,7 +3620,7 @@
           <a:p>
             <a:fld id="{0E59FD0C-5451-4CA0-86AF-E70AE3279989}" type="datetimeFigureOut">
               <a:rPr lang="en-US" dirty="0"/>
-              <a:t>3/29/16</a:t>
+              <a:t>4/2/16</a:t>
             </a:fld>
             <a:endParaRPr lang="en-US" dirty="0"/>
           </a:p>
@@ -4438,7 +4438,18 @@
                 <a:ea typeface="Consolas" charset="0"/>
                 <a:cs typeface="Consolas" charset="0"/>
               </a:rPr>
-              <a:t>Interface Flier {</a:t>
+              <a:t>interface </a:t>
+            </a:r>
+            <a:r>
+              <a:rPr lang="en-US" sz="2800" dirty="0" smtClean="0">
+                <a:solidFill>
+                  <a:srgbClr val="FF0000"/>
+                </a:solidFill>
+                <a:latin typeface="Consolas" charset="0"/>
+                <a:ea typeface="Consolas" charset="0"/>
+                <a:cs typeface="Consolas" charset="0"/>
+              </a:rPr>
+              <a:t>Flier {</a:t>
             </a:r>
           </a:p>
           <a:p>
@@ -5539,8 +5550,16 @@
           <a:lstStyle/>
           <a:p>
             <a:r>
+              <a:rPr lang="en-US" sz="3200" smtClean="0"/>
+              <a:t>Implementation </a:t>
+            </a:r>
+            <a:r>
               <a:rPr lang="en-US" sz="3200" dirty="0" smtClean="0"/>
-              <a:t>Interface inheritance provides ability to reuse code</a:t>
+              <a:t>inheritance </a:t>
+            </a:r>
+            <a:r>
+              <a:rPr lang="en-US" sz="3200" dirty="0" smtClean="0"/>
+              <a:t>provides ability to reuse code</a:t>
             </a:r>
           </a:p>
           <a:p>

</xml_diff>

<commit_message>
week 9,10: fix typo in slides
</commit_message>
<xml_diff>
--- a/week_09_10/week_09_10.pptx
+++ b/week_09_10/week_09_10.pptx
@@ -214,7 +214,7 @@
           <a:p>
             <a:fld id="{A756DEA0-F944-5946-9B95-BC7B5255CD05}" type="datetimeFigureOut">
               <a:rPr lang="en-US" smtClean="0"/>
-              <a:t>4/2/16</a:t>
+              <a:t>10/24/2016</a:t>
             </a:fld>
             <a:endParaRPr lang="en-US"/>
           </a:p>
@@ -278,38 +278,37 @@
           <a:p>
             <a:pPr lvl="0"/>
             <a:r>
-              <a:rPr lang="en-US" smtClean="0"/>
+              <a:rPr lang="en-US"/>
               <a:t>Click to edit Master text styles</a:t>
             </a:r>
           </a:p>
           <a:p>
             <a:pPr lvl="1"/>
             <a:r>
-              <a:rPr lang="en-US" smtClean="0"/>
+              <a:rPr lang="en-US"/>
               <a:t>Second level</a:t>
             </a:r>
           </a:p>
           <a:p>
             <a:pPr lvl="2"/>
             <a:r>
-              <a:rPr lang="en-US" smtClean="0"/>
+              <a:rPr lang="en-US"/>
               <a:t>Third level</a:t>
             </a:r>
           </a:p>
           <a:p>
             <a:pPr lvl="3"/>
             <a:r>
-              <a:rPr lang="en-US" smtClean="0"/>
+              <a:rPr lang="en-US"/>
               <a:t>Fourth level</a:t>
             </a:r>
           </a:p>
           <a:p>
             <a:pPr lvl="4"/>
             <a:r>
-              <a:rPr lang="en-US" smtClean="0"/>
+              <a:rPr lang="en-US"/>
               <a:t>Fifth level</a:t>
             </a:r>
-            <a:endParaRPr lang="en-US"/>
           </a:p>
         </p:txBody>
       </p:sp>
@@ -879,7 +878,7 @@
           </a:lstStyle>
           <a:p>
             <a:r>
-              <a:rPr lang="en-US" smtClean="0"/>
+              <a:rPr lang="en-US"/>
               <a:t>Click to edit Master title style</a:t>
             </a:r>
             <a:endParaRPr lang="en-US" dirty="0"/>
@@ -952,7 +951,7 @@
           </a:lstStyle>
           <a:p>
             <a:r>
-              <a:rPr lang="en-US" smtClean="0"/>
+              <a:rPr lang="en-US"/>
               <a:t>Click to edit Master subtitle style</a:t>
             </a:r>
             <a:endParaRPr lang="en-US" dirty="0"/>
@@ -984,9 +983,9 @@
             </a:lvl1pPr>
           </a:lstStyle>
           <a:p>
-            <a:fld id="{9E016143-E03C-4CFD-AFDC-14E5BDEA754C}" type="datetimeFigureOut">
-              <a:rPr lang="en-US" dirty="0"/>
-              <a:t>4/2/16</a:t>
+            <a:fld id="{326DE110-0EDF-493F-B29F-E34BC771DCE9}" type="datetime1">
+              <a:rPr lang="en-US" smtClean="0"/>
+              <a:t>10/24/2016</a:t>
             </a:fld>
             <a:endParaRPr lang="en-US" dirty="0"/>
           </a:p>
@@ -1134,83 +1133,83 @@
           <a:lstStyle/>
           <a:p>
             <a:r>
+              <a:rPr lang="en-US"/>
+              <a:t>Click to edit Master title style</a:t>
+            </a:r>
+            <a:endParaRPr lang="en-US" dirty="0"/>
+          </a:p>
+        </p:txBody>
+      </p:sp>
+      <p:sp>
+        <p:nvSpPr>
+          <p:cNvPr id="3" name="Vertical Text Placeholder 2"/>
+          <p:cNvSpPr>
+            <a:spLocks noGrp="1"/>
+          </p:cNvSpPr>
+          <p:nvPr>
+            <p:ph type="body" orient="vert" idx="1"/>
+          </p:nvPr>
+        </p:nvSpPr>
+        <p:spPr/>
+        <p:txBody>
+          <a:bodyPr vert="eaVert"/>
+          <a:lstStyle/>
+          <a:p>
+            <a:pPr lvl="0"/>
+            <a:r>
+              <a:rPr lang="en-US"/>
+              <a:t>Click to edit Master text styles</a:t>
+            </a:r>
+          </a:p>
+          <a:p>
+            <a:pPr lvl="1"/>
+            <a:r>
+              <a:rPr lang="en-US"/>
+              <a:t>Second level</a:t>
+            </a:r>
+          </a:p>
+          <a:p>
+            <a:pPr lvl="2"/>
+            <a:r>
+              <a:rPr lang="en-US"/>
+              <a:t>Third level</a:t>
+            </a:r>
+          </a:p>
+          <a:p>
+            <a:pPr lvl="3"/>
+            <a:r>
+              <a:rPr lang="en-US"/>
+              <a:t>Fourth level</a:t>
+            </a:r>
+          </a:p>
+          <a:p>
+            <a:pPr lvl="4"/>
+            <a:r>
+              <a:rPr lang="en-US"/>
+              <a:t>Fifth level</a:t>
+            </a:r>
+            <a:endParaRPr lang="en-US" dirty="0"/>
+          </a:p>
+        </p:txBody>
+      </p:sp>
+      <p:sp>
+        <p:nvSpPr>
+          <p:cNvPr id="4" name="Date Placeholder 3"/>
+          <p:cNvSpPr>
+            <a:spLocks noGrp="1"/>
+          </p:cNvSpPr>
+          <p:nvPr>
+            <p:ph type="dt" sz="half" idx="10"/>
+          </p:nvPr>
+        </p:nvSpPr>
+        <p:spPr/>
+        <p:txBody>
+          <a:bodyPr/>
+          <a:lstStyle/>
+          <a:p>
+            <a:fld id="{6BF80D31-591E-407A-BD0E-CA743A561B72}" type="datetime1">
               <a:rPr lang="en-US" smtClean="0"/>
-              <a:t>Click to edit Master title style</a:t>
-            </a:r>
-            <a:endParaRPr lang="en-US" dirty="0"/>
-          </a:p>
-        </p:txBody>
-      </p:sp>
-      <p:sp>
-        <p:nvSpPr>
-          <p:cNvPr id="3" name="Vertical Text Placeholder 2"/>
-          <p:cNvSpPr>
-            <a:spLocks noGrp="1"/>
-          </p:cNvSpPr>
-          <p:nvPr>
-            <p:ph type="body" orient="vert" idx="1"/>
-          </p:nvPr>
-        </p:nvSpPr>
-        <p:spPr/>
-        <p:txBody>
-          <a:bodyPr vert="eaVert"/>
-          <a:lstStyle/>
-          <a:p>
-            <a:pPr lvl="0"/>
-            <a:r>
-              <a:rPr lang="en-US" smtClean="0"/>
-              <a:t>Click to edit Master text styles</a:t>
-            </a:r>
-          </a:p>
-          <a:p>
-            <a:pPr lvl="1"/>
-            <a:r>
-              <a:rPr lang="en-US" smtClean="0"/>
-              <a:t>Second level</a:t>
-            </a:r>
-          </a:p>
-          <a:p>
-            <a:pPr lvl="2"/>
-            <a:r>
-              <a:rPr lang="en-US" smtClean="0"/>
-              <a:t>Third level</a:t>
-            </a:r>
-          </a:p>
-          <a:p>
-            <a:pPr lvl="3"/>
-            <a:r>
-              <a:rPr lang="en-US" smtClean="0"/>
-              <a:t>Fourth level</a:t>
-            </a:r>
-          </a:p>
-          <a:p>
-            <a:pPr lvl="4"/>
-            <a:r>
-              <a:rPr lang="en-US" smtClean="0"/>
-              <a:t>Fifth level</a:t>
-            </a:r>
-            <a:endParaRPr lang="en-US" dirty="0"/>
-          </a:p>
-        </p:txBody>
-      </p:sp>
-      <p:sp>
-        <p:nvSpPr>
-          <p:cNvPr id="4" name="Date Placeholder 3"/>
-          <p:cNvSpPr>
-            <a:spLocks noGrp="1"/>
-          </p:cNvSpPr>
-          <p:nvPr>
-            <p:ph type="dt" sz="half" idx="10"/>
-          </p:nvPr>
-        </p:nvSpPr>
-        <p:spPr/>
-        <p:txBody>
-          <a:bodyPr/>
-          <a:lstStyle/>
-          <a:p>
-            <a:fld id="{C033E54A-A8CA-48C1-9504-691B58049D29}" type="datetimeFigureOut">
-              <a:rPr lang="en-US" dirty="0"/>
-              <a:t>4/2/16</a:t>
+              <a:t>10/24/2016</a:t>
             </a:fld>
             <a:endParaRPr lang="en-US" dirty="0"/>
           </a:p>
@@ -1304,7 +1303,7 @@
           <a:lstStyle/>
           <a:p>
             <a:r>
-              <a:rPr lang="en-US" smtClean="0"/>
+              <a:rPr lang="en-US"/>
               <a:t>Click to edit Master title style</a:t>
             </a:r>
             <a:endParaRPr lang="en-US" dirty="0"/>
@@ -1333,59 +1332,59 @@
           <a:p>
             <a:pPr lvl="0"/>
             <a:r>
+              <a:rPr lang="en-US"/>
+              <a:t>Click to edit Master text styles</a:t>
+            </a:r>
+          </a:p>
+          <a:p>
+            <a:pPr lvl="1"/>
+            <a:r>
+              <a:rPr lang="en-US"/>
+              <a:t>Second level</a:t>
+            </a:r>
+          </a:p>
+          <a:p>
+            <a:pPr lvl="2"/>
+            <a:r>
+              <a:rPr lang="en-US"/>
+              <a:t>Third level</a:t>
+            </a:r>
+          </a:p>
+          <a:p>
+            <a:pPr lvl="3"/>
+            <a:r>
+              <a:rPr lang="en-US"/>
+              <a:t>Fourth level</a:t>
+            </a:r>
+          </a:p>
+          <a:p>
+            <a:pPr lvl="4"/>
+            <a:r>
+              <a:rPr lang="en-US"/>
+              <a:t>Fifth level</a:t>
+            </a:r>
+            <a:endParaRPr lang="en-US" dirty="0"/>
+          </a:p>
+        </p:txBody>
+      </p:sp>
+      <p:sp>
+        <p:nvSpPr>
+          <p:cNvPr id="4" name="Date Placeholder 3"/>
+          <p:cNvSpPr>
+            <a:spLocks noGrp="1"/>
+          </p:cNvSpPr>
+          <p:nvPr>
+            <p:ph type="dt" sz="half" idx="10"/>
+          </p:nvPr>
+        </p:nvSpPr>
+        <p:spPr/>
+        <p:txBody>
+          <a:bodyPr/>
+          <a:lstStyle/>
+          <a:p>
+            <a:fld id="{259D6031-F3A6-4A98-A512-FF59EA2EA858}" type="datetime1">
               <a:rPr lang="en-US" smtClean="0"/>
-              <a:t>Click to edit Master text styles</a:t>
-            </a:r>
-          </a:p>
-          <a:p>
-            <a:pPr lvl="1"/>
-            <a:r>
-              <a:rPr lang="en-US" smtClean="0"/>
-              <a:t>Second level</a:t>
-            </a:r>
-          </a:p>
-          <a:p>
-            <a:pPr lvl="2"/>
-            <a:r>
-              <a:rPr lang="en-US" smtClean="0"/>
-              <a:t>Third level</a:t>
-            </a:r>
-          </a:p>
-          <a:p>
-            <a:pPr lvl="3"/>
-            <a:r>
-              <a:rPr lang="en-US" smtClean="0"/>
-              <a:t>Fourth level</a:t>
-            </a:r>
-          </a:p>
-          <a:p>
-            <a:pPr lvl="4"/>
-            <a:r>
-              <a:rPr lang="en-US" smtClean="0"/>
-              <a:t>Fifth level</a:t>
-            </a:r>
-            <a:endParaRPr lang="en-US" dirty="0"/>
-          </a:p>
-        </p:txBody>
-      </p:sp>
-      <p:sp>
-        <p:nvSpPr>
-          <p:cNvPr id="4" name="Date Placeholder 3"/>
-          <p:cNvSpPr>
-            <a:spLocks noGrp="1"/>
-          </p:cNvSpPr>
-          <p:nvPr>
-            <p:ph type="dt" sz="half" idx="10"/>
-          </p:nvPr>
-        </p:nvSpPr>
-        <p:spPr/>
-        <p:txBody>
-          <a:bodyPr/>
-          <a:lstStyle/>
-          <a:p>
-            <a:fld id="{B5F6C806-BBF7-471C-9527-881CE2266695}" type="datetimeFigureOut">
-              <a:rPr lang="en-US" dirty="0"/>
-              <a:t>4/2/16</a:t>
+              <a:t>10/24/2016</a:t>
             </a:fld>
             <a:endParaRPr lang="en-US" dirty="0"/>
           </a:p>
@@ -1474,83 +1473,83 @@
           <a:lstStyle/>
           <a:p>
             <a:r>
+              <a:rPr lang="en-US"/>
+              <a:t>Click to edit Master title style</a:t>
+            </a:r>
+            <a:endParaRPr lang="en-US" dirty="0"/>
+          </a:p>
+        </p:txBody>
+      </p:sp>
+      <p:sp>
+        <p:nvSpPr>
+          <p:cNvPr id="3" name="Content Placeholder 2"/>
+          <p:cNvSpPr>
+            <a:spLocks noGrp="1"/>
+          </p:cNvSpPr>
+          <p:nvPr>
+            <p:ph idx="1"/>
+          </p:nvPr>
+        </p:nvSpPr>
+        <p:spPr/>
+        <p:txBody>
+          <a:bodyPr/>
+          <a:lstStyle/>
+          <a:p>
+            <a:pPr lvl="0"/>
+            <a:r>
+              <a:rPr lang="en-US"/>
+              <a:t>Click to edit Master text styles</a:t>
+            </a:r>
+          </a:p>
+          <a:p>
+            <a:pPr lvl="1"/>
+            <a:r>
+              <a:rPr lang="en-US"/>
+              <a:t>Second level</a:t>
+            </a:r>
+          </a:p>
+          <a:p>
+            <a:pPr lvl="2"/>
+            <a:r>
+              <a:rPr lang="en-US"/>
+              <a:t>Third level</a:t>
+            </a:r>
+          </a:p>
+          <a:p>
+            <a:pPr lvl="3"/>
+            <a:r>
+              <a:rPr lang="en-US"/>
+              <a:t>Fourth level</a:t>
+            </a:r>
+          </a:p>
+          <a:p>
+            <a:pPr lvl="4"/>
+            <a:r>
+              <a:rPr lang="en-US"/>
+              <a:t>Fifth level</a:t>
+            </a:r>
+            <a:endParaRPr lang="en-US" dirty="0"/>
+          </a:p>
+        </p:txBody>
+      </p:sp>
+      <p:sp>
+        <p:nvSpPr>
+          <p:cNvPr id="4" name="Date Placeholder 3"/>
+          <p:cNvSpPr>
+            <a:spLocks noGrp="1"/>
+          </p:cNvSpPr>
+          <p:nvPr>
+            <p:ph type="dt" sz="half" idx="10"/>
+          </p:nvPr>
+        </p:nvSpPr>
+        <p:spPr/>
+        <p:txBody>
+          <a:bodyPr/>
+          <a:lstStyle/>
+          <a:p>
+            <a:fld id="{3582BB6F-CA66-4E32-ABE7-0CB220B694B7}" type="datetime1">
               <a:rPr lang="en-US" smtClean="0"/>
-              <a:t>Click to edit Master title style</a:t>
-            </a:r>
-            <a:endParaRPr lang="en-US" dirty="0"/>
-          </a:p>
-        </p:txBody>
-      </p:sp>
-      <p:sp>
-        <p:nvSpPr>
-          <p:cNvPr id="3" name="Content Placeholder 2"/>
-          <p:cNvSpPr>
-            <a:spLocks noGrp="1"/>
-          </p:cNvSpPr>
-          <p:nvPr>
-            <p:ph idx="1"/>
-          </p:nvPr>
-        </p:nvSpPr>
-        <p:spPr/>
-        <p:txBody>
-          <a:bodyPr/>
-          <a:lstStyle/>
-          <a:p>
-            <a:pPr lvl="0"/>
-            <a:r>
-              <a:rPr lang="en-US" smtClean="0"/>
-              <a:t>Click to edit Master text styles</a:t>
-            </a:r>
-          </a:p>
-          <a:p>
-            <a:pPr lvl="1"/>
-            <a:r>
-              <a:rPr lang="en-US" smtClean="0"/>
-              <a:t>Second level</a:t>
-            </a:r>
-          </a:p>
-          <a:p>
-            <a:pPr lvl="2"/>
-            <a:r>
-              <a:rPr lang="en-US" smtClean="0"/>
-              <a:t>Third level</a:t>
-            </a:r>
-          </a:p>
-          <a:p>
-            <a:pPr lvl="3"/>
-            <a:r>
-              <a:rPr lang="en-US" smtClean="0"/>
-              <a:t>Fourth level</a:t>
-            </a:r>
-          </a:p>
-          <a:p>
-            <a:pPr lvl="4"/>
-            <a:r>
-              <a:rPr lang="en-US" smtClean="0"/>
-              <a:t>Fifth level</a:t>
-            </a:r>
-            <a:endParaRPr lang="en-US" dirty="0"/>
-          </a:p>
-        </p:txBody>
-      </p:sp>
-      <p:sp>
-        <p:nvSpPr>
-          <p:cNvPr id="4" name="Date Placeholder 3"/>
-          <p:cNvSpPr>
-            <a:spLocks noGrp="1"/>
-          </p:cNvSpPr>
-          <p:nvPr>
-            <p:ph type="dt" sz="half" idx="10"/>
-          </p:nvPr>
-        </p:nvSpPr>
-        <p:spPr/>
-        <p:txBody>
-          <a:bodyPr/>
-          <a:lstStyle/>
-          <a:p>
-            <a:fld id="{78C94063-DF36-4330-A365-08DA1FA5B7D6}" type="datetimeFigureOut">
-              <a:rPr lang="en-US" dirty="0"/>
-              <a:t>4/2/16</a:t>
+              <a:t>10/24/2016</a:t>
             </a:fld>
             <a:endParaRPr lang="en-US" dirty="0"/>
           </a:p>
@@ -1653,7 +1652,7 @@
           </a:lstStyle>
           <a:p>
             <a:r>
-              <a:rPr lang="en-US" smtClean="0"/>
+              <a:rPr lang="en-US"/>
               <a:t>Click to edit Master title style</a:t>
             </a:r>
             <a:endParaRPr lang="en-US" dirty="0"/>
@@ -1776,30 +1775,30 @@
           <a:p>
             <a:pPr lvl="0"/>
             <a:r>
+              <a:rPr lang="en-US"/>
+              <a:t>Click to edit Master text styles</a:t>
+            </a:r>
+          </a:p>
+        </p:txBody>
+      </p:sp>
+      <p:sp>
+        <p:nvSpPr>
+          <p:cNvPr id="4" name="Date Placeholder 3"/>
+          <p:cNvSpPr>
+            <a:spLocks noGrp="1"/>
+          </p:cNvSpPr>
+          <p:nvPr>
+            <p:ph type="dt" sz="half" idx="10"/>
+          </p:nvPr>
+        </p:nvSpPr>
+        <p:spPr/>
+        <p:txBody>
+          <a:bodyPr/>
+          <a:lstStyle/>
+          <a:p>
+            <a:fld id="{B6292A40-2988-49C5-B6D2-A7C698760584}" type="datetime1">
               <a:rPr lang="en-US" smtClean="0"/>
-              <a:t>Click to edit Master text styles</a:t>
-            </a:r>
-          </a:p>
-        </p:txBody>
-      </p:sp>
-      <p:sp>
-        <p:nvSpPr>
-          <p:cNvPr id="4" name="Date Placeholder 3"/>
-          <p:cNvSpPr>
-            <a:spLocks noGrp="1"/>
-          </p:cNvSpPr>
-          <p:nvPr>
-            <p:ph type="dt" sz="half" idx="10"/>
-          </p:nvPr>
-        </p:nvSpPr>
-        <p:spPr/>
-        <p:txBody>
-          <a:bodyPr/>
-          <a:lstStyle/>
-          <a:p>
-            <a:fld id="{908A7C6C-0F39-4D70-8E8D-FE5B9C95FA73}" type="datetimeFigureOut">
-              <a:rPr lang="en-US" dirty="0"/>
-              <a:t>4/2/16</a:t>
+              <a:t>10/24/2016</a:t>
             </a:fld>
             <a:endParaRPr lang="en-US" dirty="0"/>
           </a:p>
@@ -1926,7 +1925,7 @@
           <a:lstStyle/>
           <a:p>
             <a:r>
-              <a:rPr lang="en-US" smtClean="0"/>
+              <a:rPr lang="en-US"/>
               <a:t>Click to edit Master title style</a:t>
             </a:r>
             <a:endParaRPr lang="en-US" dirty="0"/>
@@ -1983,35 +1982,35 @@
           <a:p>
             <a:pPr lvl="0"/>
             <a:r>
-              <a:rPr lang="en-US" smtClean="0"/>
+              <a:rPr lang="en-US"/>
               <a:t>Click to edit Master text styles</a:t>
             </a:r>
           </a:p>
           <a:p>
             <a:pPr lvl="1"/>
             <a:r>
-              <a:rPr lang="en-US" smtClean="0"/>
+              <a:rPr lang="en-US"/>
               <a:t>Second level</a:t>
             </a:r>
           </a:p>
           <a:p>
             <a:pPr lvl="2"/>
             <a:r>
-              <a:rPr lang="en-US" smtClean="0"/>
+              <a:rPr lang="en-US"/>
               <a:t>Third level</a:t>
             </a:r>
           </a:p>
           <a:p>
             <a:pPr lvl="3"/>
             <a:r>
-              <a:rPr lang="en-US" smtClean="0"/>
+              <a:rPr lang="en-US"/>
               <a:t>Fourth level</a:t>
             </a:r>
           </a:p>
           <a:p>
             <a:pPr lvl="4"/>
             <a:r>
-              <a:rPr lang="en-US" smtClean="0"/>
+              <a:rPr lang="en-US"/>
               <a:t>Fifth level</a:t>
             </a:r>
             <a:endParaRPr lang="en-US" dirty="0"/>
@@ -2068,59 +2067,59 @@
           <a:p>
             <a:pPr lvl="0"/>
             <a:r>
+              <a:rPr lang="en-US"/>
+              <a:t>Click to edit Master text styles</a:t>
+            </a:r>
+          </a:p>
+          <a:p>
+            <a:pPr lvl="1"/>
+            <a:r>
+              <a:rPr lang="en-US"/>
+              <a:t>Second level</a:t>
+            </a:r>
+          </a:p>
+          <a:p>
+            <a:pPr lvl="2"/>
+            <a:r>
+              <a:rPr lang="en-US"/>
+              <a:t>Third level</a:t>
+            </a:r>
+          </a:p>
+          <a:p>
+            <a:pPr lvl="3"/>
+            <a:r>
+              <a:rPr lang="en-US"/>
+              <a:t>Fourth level</a:t>
+            </a:r>
+          </a:p>
+          <a:p>
+            <a:pPr lvl="4"/>
+            <a:r>
+              <a:rPr lang="en-US"/>
+              <a:t>Fifth level</a:t>
+            </a:r>
+            <a:endParaRPr lang="en-US" dirty="0"/>
+          </a:p>
+        </p:txBody>
+      </p:sp>
+      <p:sp>
+        <p:nvSpPr>
+          <p:cNvPr id="5" name="Date Placeholder 4"/>
+          <p:cNvSpPr>
+            <a:spLocks noGrp="1"/>
+          </p:cNvSpPr>
+          <p:nvPr>
+            <p:ph type="dt" sz="half" idx="10"/>
+          </p:nvPr>
+        </p:nvSpPr>
+        <p:spPr/>
+        <p:txBody>
+          <a:bodyPr/>
+          <a:lstStyle/>
+          <a:p>
+            <a:fld id="{1EA320A0-4D62-425B-8CC0-3E16654C4DDE}" type="datetime1">
               <a:rPr lang="en-US" smtClean="0"/>
-              <a:t>Click to edit Master text styles</a:t>
-            </a:r>
-          </a:p>
-          <a:p>
-            <a:pPr lvl="1"/>
-            <a:r>
-              <a:rPr lang="en-US" smtClean="0"/>
-              <a:t>Second level</a:t>
-            </a:r>
-          </a:p>
-          <a:p>
-            <a:pPr lvl="2"/>
-            <a:r>
-              <a:rPr lang="en-US" smtClean="0"/>
-              <a:t>Third level</a:t>
-            </a:r>
-          </a:p>
-          <a:p>
-            <a:pPr lvl="3"/>
-            <a:r>
-              <a:rPr lang="en-US" smtClean="0"/>
-              <a:t>Fourth level</a:t>
-            </a:r>
-          </a:p>
-          <a:p>
-            <a:pPr lvl="4"/>
-            <a:r>
-              <a:rPr lang="en-US" smtClean="0"/>
-              <a:t>Fifth level</a:t>
-            </a:r>
-            <a:endParaRPr lang="en-US" dirty="0"/>
-          </a:p>
-        </p:txBody>
-      </p:sp>
-      <p:sp>
-        <p:nvSpPr>
-          <p:cNvPr id="5" name="Date Placeholder 4"/>
-          <p:cNvSpPr>
-            <a:spLocks noGrp="1"/>
-          </p:cNvSpPr>
-          <p:nvPr>
-            <p:ph type="dt" sz="half" idx="10"/>
-          </p:nvPr>
-        </p:nvSpPr>
-        <p:spPr/>
-        <p:txBody>
-          <a:bodyPr/>
-          <a:lstStyle/>
-          <a:p>
-            <a:fld id="{DFCFA4AC-08CC-42CE-BD01-C191750A04EC}" type="datetimeFigureOut">
-              <a:rPr lang="en-US" dirty="0"/>
-              <a:t>4/2/16</a:t>
+              <a:t>10/24/2016</a:t>
             </a:fld>
             <a:endParaRPr lang="en-US" dirty="0"/>
           </a:p>
@@ -2209,7 +2208,7 @@
           <a:lstStyle/>
           <a:p>
             <a:r>
-              <a:rPr lang="en-US" smtClean="0"/>
+              <a:rPr lang="en-US"/>
               <a:t>Click to edit Master title style</a:t>
             </a:r>
             <a:endParaRPr lang="en-US" dirty="0"/>
@@ -2284,7 +2283,7 @@
           <a:p>
             <a:pPr lvl="0"/>
             <a:r>
-              <a:rPr lang="en-US" smtClean="0"/>
+              <a:rPr lang="en-US"/>
               <a:t>Click to edit Master text styles</a:t>
             </a:r>
           </a:p>
@@ -2340,35 +2339,35 @@
           <a:p>
             <a:pPr lvl="0"/>
             <a:r>
-              <a:rPr lang="en-US" smtClean="0"/>
+              <a:rPr lang="en-US"/>
               <a:t>Click to edit Master text styles</a:t>
             </a:r>
           </a:p>
           <a:p>
             <a:pPr lvl="1"/>
             <a:r>
-              <a:rPr lang="en-US" smtClean="0"/>
+              <a:rPr lang="en-US"/>
               <a:t>Second level</a:t>
             </a:r>
           </a:p>
           <a:p>
             <a:pPr lvl="2"/>
             <a:r>
-              <a:rPr lang="en-US" smtClean="0"/>
+              <a:rPr lang="en-US"/>
               <a:t>Third level</a:t>
             </a:r>
           </a:p>
           <a:p>
             <a:pPr lvl="3"/>
             <a:r>
-              <a:rPr lang="en-US" smtClean="0"/>
+              <a:rPr lang="en-US"/>
               <a:t>Fourth level</a:t>
             </a:r>
           </a:p>
           <a:p>
             <a:pPr lvl="4"/>
             <a:r>
-              <a:rPr lang="en-US" smtClean="0"/>
+              <a:rPr lang="en-US"/>
               <a:t>Fifth level</a:t>
             </a:r>
             <a:endParaRPr lang="en-US" dirty="0"/>
@@ -2458,7 +2457,7 @@
               <a:buNone/>
             </a:pPr>
             <a:r>
-              <a:rPr lang="en-US" smtClean="0"/>
+              <a:rPr lang="en-US"/>
               <a:t>Click to edit Master text styles</a:t>
             </a:r>
           </a:p>
@@ -2514,59 +2513,59 @@
           <a:p>
             <a:pPr lvl="0"/>
             <a:r>
+              <a:rPr lang="en-US"/>
+              <a:t>Click to edit Master text styles</a:t>
+            </a:r>
+          </a:p>
+          <a:p>
+            <a:pPr lvl="1"/>
+            <a:r>
+              <a:rPr lang="en-US"/>
+              <a:t>Second level</a:t>
+            </a:r>
+          </a:p>
+          <a:p>
+            <a:pPr lvl="2"/>
+            <a:r>
+              <a:rPr lang="en-US"/>
+              <a:t>Third level</a:t>
+            </a:r>
+          </a:p>
+          <a:p>
+            <a:pPr lvl="3"/>
+            <a:r>
+              <a:rPr lang="en-US"/>
+              <a:t>Fourth level</a:t>
+            </a:r>
+          </a:p>
+          <a:p>
+            <a:pPr lvl="4"/>
+            <a:r>
+              <a:rPr lang="en-US"/>
+              <a:t>Fifth level</a:t>
+            </a:r>
+            <a:endParaRPr lang="en-US" dirty="0"/>
+          </a:p>
+        </p:txBody>
+      </p:sp>
+      <p:sp>
+        <p:nvSpPr>
+          <p:cNvPr id="7" name="Date Placeholder 6"/>
+          <p:cNvSpPr>
+            <a:spLocks noGrp="1"/>
+          </p:cNvSpPr>
+          <p:nvPr>
+            <p:ph type="dt" sz="half" idx="10"/>
+          </p:nvPr>
+        </p:nvSpPr>
+        <p:spPr/>
+        <p:txBody>
+          <a:bodyPr/>
+          <a:lstStyle/>
+          <a:p>
+            <a:fld id="{6703946D-EBB1-40AB-AA0B-84DFF0753397}" type="datetime1">
               <a:rPr lang="en-US" smtClean="0"/>
-              <a:t>Click to edit Master text styles</a:t>
-            </a:r>
-          </a:p>
-          <a:p>
-            <a:pPr lvl="1"/>
-            <a:r>
-              <a:rPr lang="en-US" smtClean="0"/>
-              <a:t>Second level</a:t>
-            </a:r>
-          </a:p>
-          <a:p>
-            <a:pPr lvl="2"/>
-            <a:r>
-              <a:rPr lang="en-US" smtClean="0"/>
-              <a:t>Third level</a:t>
-            </a:r>
-          </a:p>
-          <a:p>
-            <a:pPr lvl="3"/>
-            <a:r>
-              <a:rPr lang="en-US" smtClean="0"/>
-              <a:t>Fourth level</a:t>
-            </a:r>
-          </a:p>
-          <a:p>
-            <a:pPr lvl="4"/>
-            <a:r>
-              <a:rPr lang="en-US" smtClean="0"/>
-              <a:t>Fifth level</a:t>
-            </a:r>
-            <a:endParaRPr lang="en-US" dirty="0"/>
-          </a:p>
-        </p:txBody>
-      </p:sp>
-      <p:sp>
-        <p:nvSpPr>
-          <p:cNvPr id="7" name="Date Placeholder 6"/>
-          <p:cNvSpPr>
-            <a:spLocks noGrp="1"/>
-          </p:cNvSpPr>
-          <p:nvPr>
-            <p:ph type="dt" sz="half" idx="10"/>
-          </p:nvPr>
-        </p:nvSpPr>
-        <p:spPr/>
-        <p:txBody>
-          <a:bodyPr/>
-          <a:lstStyle/>
-          <a:p>
-            <a:fld id="{1BA7A723-92A7-435B-B681-F25B092FEFEB}" type="datetimeFigureOut">
-              <a:rPr lang="en-US" dirty="0"/>
-              <a:t>4/2/16</a:t>
+              <a:t>10/24/2016</a:t>
             </a:fld>
             <a:endParaRPr lang="en-US" dirty="0"/>
           </a:p>
@@ -2655,31 +2654,31 @@
           <a:lstStyle/>
           <a:p>
             <a:r>
+              <a:rPr lang="en-US"/>
+              <a:t>Click to edit Master title style</a:t>
+            </a:r>
+            <a:endParaRPr lang="en-US" dirty="0"/>
+          </a:p>
+        </p:txBody>
+      </p:sp>
+      <p:sp>
+        <p:nvSpPr>
+          <p:cNvPr id="3" name="Date Placeholder 2"/>
+          <p:cNvSpPr>
+            <a:spLocks noGrp="1"/>
+          </p:cNvSpPr>
+          <p:nvPr>
+            <p:ph type="dt" sz="half" idx="10"/>
+          </p:nvPr>
+        </p:nvSpPr>
+        <p:spPr/>
+        <p:txBody>
+          <a:bodyPr/>
+          <a:lstStyle/>
+          <a:p>
+            <a:fld id="{DF3B3F61-5581-4B50-8ED5-04CB839EC62B}" type="datetime1">
               <a:rPr lang="en-US" smtClean="0"/>
-              <a:t>Click to edit Master title style</a:t>
-            </a:r>
-            <a:endParaRPr lang="en-US" dirty="0"/>
-          </a:p>
-        </p:txBody>
-      </p:sp>
-      <p:sp>
-        <p:nvSpPr>
-          <p:cNvPr id="3" name="Date Placeholder 2"/>
-          <p:cNvSpPr>
-            <a:spLocks noGrp="1"/>
-          </p:cNvSpPr>
-          <p:nvPr>
-            <p:ph type="dt" sz="half" idx="10"/>
-          </p:nvPr>
-        </p:nvSpPr>
-        <p:spPr/>
-        <p:txBody>
-          <a:bodyPr/>
-          <a:lstStyle/>
-          <a:p>
-            <a:fld id="{4F170639-886C-4FCF-9EAB-ABB5DA3F3F4A}" type="datetimeFigureOut">
-              <a:rPr lang="en-US" dirty="0"/>
-              <a:t>4/2/16</a:t>
+              <a:t>10/24/2016</a:t>
             </a:fld>
             <a:endParaRPr lang="en-US" dirty="0"/>
           </a:p>
@@ -2767,9 +2766,9 @@
           <a:bodyPr/>
           <a:lstStyle/>
           <a:p>
-            <a:fld id="{22230651-31F4-45D2-98AE-A2108F41BC07}" type="datetimeFigureOut">
-              <a:rPr lang="en-US" dirty="0"/>
-              <a:t>4/2/16</a:t>
+            <a:fld id="{3CE50ABE-0F9F-447A-A33D-A3CB2BFD963B}" type="datetime1">
+              <a:rPr lang="en-US" smtClean="0"/>
+              <a:t>10/24/2016</a:t>
             </a:fld>
             <a:endParaRPr lang="en-US" dirty="0"/>
           </a:p>
@@ -2869,7 +2868,7 @@
           </a:lstStyle>
           <a:p>
             <a:r>
-              <a:rPr lang="en-US" smtClean="0"/>
+              <a:rPr lang="en-US"/>
               <a:t>Click to edit Master title style</a:t>
             </a:r>
             <a:endParaRPr lang="en-US" dirty="0"/>
@@ -2926,35 +2925,35 @@
           <a:p>
             <a:pPr lvl="0"/>
             <a:r>
-              <a:rPr lang="en-US" smtClean="0"/>
+              <a:rPr lang="en-US"/>
               <a:t>Click to edit Master text styles</a:t>
             </a:r>
           </a:p>
           <a:p>
             <a:pPr lvl="1"/>
             <a:r>
-              <a:rPr lang="en-US" smtClean="0"/>
+              <a:rPr lang="en-US"/>
               <a:t>Second level</a:t>
             </a:r>
           </a:p>
           <a:p>
             <a:pPr lvl="2"/>
             <a:r>
-              <a:rPr lang="en-US" smtClean="0"/>
+              <a:rPr lang="en-US"/>
               <a:t>Third level</a:t>
             </a:r>
           </a:p>
           <a:p>
             <a:pPr lvl="3"/>
             <a:r>
-              <a:rPr lang="en-US" smtClean="0"/>
+              <a:rPr lang="en-US"/>
               <a:t>Fourth level</a:t>
             </a:r>
           </a:p>
           <a:p>
             <a:pPr lvl="4"/>
             <a:r>
-              <a:rPr lang="en-US" smtClean="0"/>
+              <a:rPr lang="en-US"/>
               <a:t>Fifth level</a:t>
             </a:r>
             <a:endParaRPr lang="en-US" dirty="0"/>
@@ -3028,30 +3027,30 @@
           <a:p>
             <a:pPr lvl="0"/>
             <a:r>
+              <a:rPr lang="en-US"/>
+              <a:t>Click to edit Master text styles</a:t>
+            </a:r>
+          </a:p>
+        </p:txBody>
+      </p:sp>
+      <p:sp>
+        <p:nvSpPr>
+          <p:cNvPr id="5" name="Date Placeholder 4"/>
+          <p:cNvSpPr>
+            <a:spLocks noGrp="1"/>
+          </p:cNvSpPr>
+          <p:nvPr>
+            <p:ph type="dt" sz="half" idx="10"/>
+          </p:nvPr>
+        </p:nvSpPr>
+        <p:spPr/>
+        <p:txBody>
+          <a:bodyPr/>
+          <a:lstStyle/>
+          <a:p>
+            <a:fld id="{F5083991-97CE-4145-8008-4C927E5BEA96}" type="datetime1">
               <a:rPr lang="en-US" smtClean="0"/>
-              <a:t>Click to edit Master text styles</a:t>
-            </a:r>
-          </a:p>
-        </p:txBody>
-      </p:sp>
-      <p:sp>
-        <p:nvSpPr>
-          <p:cNvPr id="5" name="Date Placeholder 4"/>
-          <p:cNvSpPr>
-            <a:spLocks noGrp="1"/>
-          </p:cNvSpPr>
-          <p:nvPr>
-            <p:ph type="dt" sz="half" idx="10"/>
-          </p:nvPr>
-        </p:nvSpPr>
-        <p:spPr/>
-        <p:txBody>
-          <a:bodyPr/>
-          <a:lstStyle/>
-          <a:p>
-            <a:fld id="{6F53789A-C914-4DB1-8815-80B5EC7335C5}" type="datetimeFigureOut">
-              <a:rPr lang="en-US" dirty="0"/>
-              <a:t>4/2/16</a:t>
+              <a:t>10/24/2016</a:t>
             </a:fld>
             <a:endParaRPr lang="en-US" dirty="0"/>
           </a:p>
@@ -3193,7 +3192,7 @@
           </a:lstStyle>
           <a:p>
             <a:r>
-              <a:rPr lang="en-US" smtClean="0"/>
+              <a:rPr lang="en-US"/>
               <a:t>Click to edit Master title style</a:t>
             </a:r>
             <a:endParaRPr lang="en-US" dirty="0"/>
@@ -3268,7 +3267,7 @@
           </a:lstStyle>
           <a:p>
             <a:r>
-              <a:rPr lang="en-US" smtClean="0"/>
+              <a:rPr lang="en-US"/>
               <a:t>Drag picture to placeholder or click icon to add</a:t>
             </a:r>
             <a:endParaRPr lang="en-US" dirty="0"/>
@@ -3348,30 +3347,30 @@
           <a:p>
             <a:pPr lvl="0"/>
             <a:r>
+              <a:rPr lang="en-US"/>
+              <a:t>Click to edit Master text styles</a:t>
+            </a:r>
+          </a:p>
+        </p:txBody>
+      </p:sp>
+      <p:sp>
+        <p:nvSpPr>
+          <p:cNvPr id="5" name="Date Placeholder 4"/>
+          <p:cNvSpPr>
+            <a:spLocks noGrp="1"/>
+          </p:cNvSpPr>
+          <p:nvPr>
+            <p:ph type="dt" sz="half" idx="10"/>
+          </p:nvPr>
+        </p:nvSpPr>
+        <p:spPr/>
+        <p:txBody>
+          <a:bodyPr/>
+          <a:lstStyle/>
+          <a:p>
+            <a:fld id="{A6F9DBC4-4719-4263-A42E-DC94CBE81A7A}" type="datetime1">
               <a:rPr lang="en-US" smtClean="0"/>
-              <a:t>Click to edit Master text styles</a:t>
-            </a:r>
-          </a:p>
-        </p:txBody>
-      </p:sp>
-      <p:sp>
-        <p:nvSpPr>
-          <p:cNvPr id="5" name="Date Placeholder 4"/>
-          <p:cNvSpPr>
-            <a:spLocks noGrp="1"/>
-          </p:cNvSpPr>
-          <p:nvPr>
-            <p:ph type="dt" sz="half" idx="10"/>
-          </p:nvPr>
-        </p:nvSpPr>
-        <p:spPr/>
-        <p:txBody>
-          <a:bodyPr/>
-          <a:lstStyle/>
-          <a:p>
-            <a:fld id="{5E6440AA-91A0-436F-8FDB-C0F939DCAE21}" type="datetimeFigureOut">
-              <a:rPr lang="en-US" dirty="0"/>
-              <a:t>4/2/16</a:t>
+              <a:t>10/24/2016</a:t>
             </a:fld>
             <a:endParaRPr lang="en-US" dirty="0"/>
           </a:p>
@@ -3515,7 +3514,7 @@
           <a:lstStyle/>
           <a:p>
             <a:r>
-              <a:rPr lang="en-US" smtClean="0"/>
+              <a:rPr lang="en-US"/>
               <a:t>Click to edit Master title style</a:t>
             </a:r>
             <a:endParaRPr lang="en-US" dirty="0"/>
@@ -3549,35 +3548,35 @@
           <a:p>
             <a:pPr lvl="0"/>
             <a:r>
-              <a:rPr lang="en-US" smtClean="0"/>
+              <a:rPr lang="en-US"/>
               <a:t>Click to edit Master text styles</a:t>
             </a:r>
           </a:p>
           <a:p>
             <a:pPr lvl="1"/>
             <a:r>
-              <a:rPr lang="en-US" smtClean="0"/>
+              <a:rPr lang="en-US"/>
               <a:t>Second level</a:t>
             </a:r>
           </a:p>
           <a:p>
             <a:pPr lvl="2"/>
             <a:r>
-              <a:rPr lang="en-US" smtClean="0"/>
+              <a:rPr lang="en-US"/>
               <a:t>Third level</a:t>
             </a:r>
           </a:p>
           <a:p>
             <a:pPr lvl="3"/>
             <a:r>
-              <a:rPr lang="en-US" smtClean="0"/>
+              <a:rPr lang="en-US"/>
               <a:t>Fourth level</a:t>
             </a:r>
           </a:p>
           <a:p>
             <a:pPr lvl="4"/>
             <a:r>
-              <a:rPr lang="en-US" smtClean="0"/>
+              <a:rPr lang="en-US"/>
               <a:t>Fifth level</a:t>
             </a:r>
             <a:endParaRPr lang="en-US" dirty="0"/>
@@ -3618,9 +3617,9 @@
             </a:lvl1pPr>
           </a:lstStyle>
           <a:p>
-            <a:fld id="{0E59FD0C-5451-4CA0-86AF-E70AE3279989}" type="datetimeFigureOut">
-              <a:rPr lang="en-US" dirty="0"/>
-              <a:t>4/2/16</a:t>
+            <a:fld id="{18264869-4419-47D8-8A95-EB4F7C3D1B59}" type="datetime1">
+              <a:rPr lang="en-US" smtClean="0"/>
+              <a:t>10/24/2016</a:t>
             </a:fld>
             <a:endParaRPr lang="en-US" dirty="0"/>
           </a:p>
@@ -3725,7 +3724,7 @@
     <p:sldLayoutId id="2147483850" r:id="rId10"/>
     <p:sldLayoutId id="2147483851" r:id="rId11"/>
   </p:sldLayoutIdLst>
-  <p:hf sldNum="0" hdr="0" ftr="0" dt="0"/>
+  <p:hf hdr="0" ftr="0" dt="0"/>
   <p:txStyles>
     <p:titleStyle>
       <a:lvl1pPr algn="l" defTabSz="914400" rtl="0" eaLnBrk="1" latinLnBrk="0" hangingPunct="1">
@@ -4121,10 +4120,9 @@
           <a:lstStyle/>
           <a:p>
             <a:r>
-              <a:rPr lang="en-US" dirty="0" smtClean="0"/>
+              <a:rPr lang="en-US" dirty="0"/>
               <a:t>Programming Fundamentals for Android</a:t>
             </a:r>
-            <a:endParaRPr lang="en-US" dirty="0"/>
           </a:p>
         </p:txBody>
       </p:sp>
@@ -4144,15 +4142,34 @@
           <a:lstStyle/>
           <a:p>
             <a:r>
-              <a:rPr lang="en-US" dirty="0" smtClean="0"/>
+              <a:rPr lang="en-US" dirty="0"/>
               <a:t>Weeks 9 and 10: Abstract Classes and Interfaces</a:t>
             </a:r>
           </a:p>
-          <a:p>
-            <a:r>
-              <a:rPr lang="en-US" dirty="0" smtClean="0"/>
-              <a:t>March 24, 2016 and March 31, 2016</a:t>
-            </a:r>
+        </p:txBody>
+      </p:sp>
+      <p:sp>
+        <p:nvSpPr>
+          <p:cNvPr id="4" name="Slide Number Placeholder 3"/>
+          <p:cNvSpPr>
+            <a:spLocks noGrp="1"/>
+          </p:cNvSpPr>
+          <p:nvPr>
+            <p:ph type="sldNum" sz="quarter" idx="12"/>
+          </p:nvPr>
+        </p:nvSpPr>
+        <p:spPr/>
+        <p:txBody>
+          <a:bodyPr>
+            <a:normAutofit lnSpcReduction="10000"/>
+          </a:bodyPr>
+          <a:lstStyle/>
+          <a:p>
+            <a:fld id="{4FAB73BC-B049-4115-A692-8D63A059BFB8}" type="slidenum">
+              <a:rPr lang="en-US" smtClean="0"/>
+              <a:pPr/>
+              <a:t>1</a:t>
+            </a:fld>
             <a:endParaRPr lang="en-US" dirty="0"/>
           </a:p>
         </p:txBody>
@@ -4203,10 +4220,9 @@
           <a:lstStyle/>
           <a:p>
             <a:r>
-              <a:rPr lang="en-US" dirty="0" smtClean="0"/>
+              <a:rPr lang="en-US" dirty="0"/>
               <a:t>Interfaces</a:t>
             </a:r>
-            <a:endParaRPr lang="en-US" dirty="0"/>
           </a:p>
         </p:txBody>
       </p:sp>
@@ -4228,23 +4244,48 @@
           <a:lstStyle/>
           <a:p>
             <a:r>
-              <a:rPr lang="en-US" sz="3600" dirty="0" smtClean="0"/>
+              <a:rPr lang="en-US" sz="3600" dirty="0"/>
               <a:t>We can formally define an interface using the </a:t>
             </a:r>
             <a:r>
-              <a:rPr lang="en-US" sz="3600" i="1" dirty="0" smtClean="0"/>
+              <a:rPr lang="en-US" sz="3600" i="1" dirty="0"/>
               <a:t>interface </a:t>
             </a:r>
             <a:r>
-              <a:rPr lang="en-US" sz="3600" dirty="0" smtClean="0"/>
+              <a:rPr lang="en-US" sz="3600" dirty="0"/>
               <a:t>reserved word</a:t>
             </a:r>
           </a:p>
           <a:p>
             <a:r>
-              <a:rPr lang="en-US" sz="3600" dirty="0" smtClean="0"/>
+              <a:rPr lang="en-US" sz="3600" dirty="0"/>
               <a:t>Interface types have no implementations</a:t>
             </a:r>
+          </a:p>
+        </p:txBody>
+      </p:sp>
+      <p:sp>
+        <p:nvSpPr>
+          <p:cNvPr id="2" name="Slide Number Placeholder 1"/>
+          <p:cNvSpPr>
+            <a:spLocks noGrp="1"/>
+          </p:cNvSpPr>
+          <p:nvPr>
+            <p:ph type="sldNum" sz="quarter" idx="12"/>
+          </p:nvPr>
+        </p:nvSpPr>
+        <p:spPr/>
+        <p:txBody>
+          <a:bodyPr>
+            <a:normAutofit lnSpcReduction="10000"/>
+          </a:bodyPr>
+          <a:lstStyle/>
+          <a:p>
+            <a:fld id="{4FAB73BC-B049-4115-A692-8D63A059BFB8}" type="slidenum">
+              <a:rPr lang="en-US" smtClean="0"/>
+              <a:t>10</a:t>
+            </a:fld>
+            <a:endParaRPr lang="en-US" dirty="0"/>
           </a:p>
         </p:txBody>
       </p:sp>
@@ -4294,10 +4335,9 @@
           <a:lstStyle/>
           <a:p>
             <a:r>
-              <a:rPr lang="en-US" dirty="0" smtClean="0"/>
+              <a:rPr lang="en-US" dirty="0"/>
               <a:t>Declaring an Interface</a:t>
             </a:r>
-            <a:endParaRPr lang="en-US" dirty="0"/>
           </a:p>
         </p:txBody>
       </p:sp>
@@ -4319,84 +4359,83 @@
           <a:lstStyle/>
           <a:p>
             <a:r>
-              <a:rPr lang="en-US" dirty="0" smtClean="0"/>
+              <a:rPr lang="en-US" dirty="0"/>
               <a:t>Similar to class declaration</a:t>
             </a:r>
           </a:p>
           <a:p>
             <a:r>
-              <a:rPr lang="en-US" dirty="0" smtClean="0"/>
+              <a:rPr lang="en-US" dirty="0"/>
               <a:t>Use </a:t>
             </a:r>
             <a:r>
-              <a:rPr lang="en-US" i="1" dirty="0" smtClean="0"/>
+              <a:rPr lang="en-US" i="1" dirty="0"/>
               <a:t>interface </a:t>
             </a:r>
             <a:r>
-              <a:rPr lang="en-US" dirty="0" smtClean="0"/>
+              <a:rPr lang="en-US" dirty="0"/>
               <a:t>instead of </a:t>
             </a:r>
             <a:r>
-              <a:rPr lang="en-US" i="1" dirty="0" smtClean="0"/>
+              <a:rPr lang="en-US" i="1" dirty="0"/>
               <a:t>class</a:t>
             </a:r>
           </a:p>
           <a:p>
             <a:r>
-              <a:rPr lang="en-US" dirty="0" smtClean="0"/>
+              <a:rPr lang="en-US" dirty="0"/>
               <a:t>A lot of interfaces end in </a:t>
             </a:r>
             <a:r>
-              <a:rPr lang="en-US" i="1" dirty="0" smtClean="0"/>
+              <a:rPr lang="en-US" i="1" dirty="0"/>
               <a:t>–able</a:t>
             </a:r>
             <a:r>
-              <a:rPr lang="en-US" dirty="0" smtClean="0"/>
+              <a:rPr lang="en-US" dirty="0"/>
               <a:t> (Callable, </a:t>
             </a:r>
             <a:r>
-              <a:rPr lang="en-US" dirty="0" err="1" smtClean="0"/>
+              <a:rPr lang="en-US" dirty="0" err="1"/>
               <a:t>Throwable</a:t>
             </a:r>
             <a:r>
-              <a:rPr lang="en-US" dirty="0" smtClean="0"/>
+              <a:rPr lang="en-US" dirty="0"/>
               <a:t>, </a:t>
             </a:r>
             <a:r>
-              <a:rPr lang="en-US" dirty="0" err="1" smtClean="0"/>
+              <a:rPr lang="en-US" dirty="0" err="1"/>
               <a:t>Iterable</a:t>
             </a:r>
             <a:r>
-              <a:rPr lang="en-US" dirty="0" smtClean="0"/>
+              <a:rPr lang="en-US" dirty="0"/>
               <a:t>) but there are many that do not (Collection, Map, List)</a:t>
             </a:r>
           </a:p>
           <a:p>
             <a:r>
-              <a:rPr lang="en-US" dirty="0" smtClean="0"/>
+              <a:rPr lang="en-US" dirty="0"/>
               <a:t>Methods declared in an Interface are implicitly publically-</a:t>
             </a:r>
             <a:r>
-              <a:rPr lang="en-US" dirty="0" err="1" smtClean="0"/>
+              <a:rPr lang="en-US" dirty="0" err="1"/>
               <a:t>accessable</a:t>
             </a:r>
             <a:r>
-              <a:rPr lang="en-US" dirty="0" smtClean="0"/>
+              <a:rPr lang="en-US" dirty="0"/>
               <a:t>; using private or protected will result in an error</a:t>
             </a:r>
           </a:p>
           <a:p>
             <a:r>
-              <a:rPr lang="en-US" dirty="0" smtClean="0"/>
+              <a:rPr lang="en-US" dirty="0"/>
               <a:t>Interface fields are constants</a:t>
             </a:r>
           </a:p>
           <a:p>
             <a:r>
-              <a:rPr lang="en-US" dirty="0" smtClean="0"/>
-              <a:t>Method declarations must end with a semi-colon</a:t>
-            </a:r>
-            <a:endParaRPr lang="en-US" dirty="0"/>
+              <a:rPr lang="en-US" dirty="0"/>
+              <a:t>Method declarations must end with a semicolon</a:t>
+            </a:r>
           </a:p>
         </p:txBody>
       </p:sp>
@@ -4430,7 +4469,7 @@
               <a:buNone/>
             </a:pPr>
             <a:r>
-              <a:rPr lang="en-US" sz="2800" dirty="0" smtClean="0">
+              <a:rPr lang="en-US" sz="2800" dirty="0">
                 <a:solidFill>
                   <a:srgbClr val="FF0000"/>
                 </a:solidFill>
@@ -4438,18 +4477,7 @@
                 <a:ea typeface="Consolas" charset="0"/>
                 <a:cs typeface="Consolas" charset="0"/>
               </a:rPr>
-              <a:t>interface </a:t>
-            </a:r>
-            <a:r>
-              <a:rPr lang="en-US" sz="2800" dirty="0" smtClean="0">
-                <a:solidFill>
-                  <a:srgbClr val="FF0000"/>
-                </a:solidFill>
-                <a:latin typeface="Consolas" charset="0"/>
-                <a:ea typeface="Consolas" charset="0"/>
-                <a:cs typeface="Consolas" charset="0"/>
-              </a:rPr>
-              <a:t>Flier {</a:t>
+              <a:t>interface Flier {</a:t>
             </a:r>
           </a:p>
           <a:p>
@@ -4466,7 +4494,7 @@
               <a:buNone/>
             </a:pPr>
             <a:r>
-              <a:rPr lang="en-US" sz="2800" dirty="0" smtClean="0">
+              <a:rPr lang="en-US" sz="2800" dirty="0">
                 <a:solidFill>
                   <a:srgbClr val="FF0000"/>
                 </a:solidFill>
@@ -4499,18 +4527,7 @@
                 <a:ea typeface="Consolas" charset="0"/>
                 <a:cs typeface="Consolas" charset="0"/>
               </a:rPr>
-              <a:t> </a:t>
-            </a:r>
-            <a:r>
-              <a:rPr lang="en-US" sz="2800" dirty="0" smtClean="0">
-                <a:solidFill>
-                  <a:srgbClr val="FF0000"/>
-                </a:solidFill>
-                <a:latin typeface="Consolas" charset="0"/>
-                <a:ea typeface="Consolas" charset="0"/>
-                <a:cs typeface="Consolas" charset="0"/>
-              </a:rPr>
-              <a:t>   void fly();</a:t>
+              <a:t>    void fly();</a:t>
             </a:r>
           </a:p>
           <a:p>
@@ -4535,18 +4552,7 @@
                 <a:ea typeface="Consolas" charset="0"/>
                 <a:cs typeface="Consolas" charset="0"/>
               </a:rPr>
-              <a:t> </a:t>
-            </a:r>
-            <a:r>
-              <a:rPr lang="en-US" sz="2800" dirty="0" smtClean="0">
-                <a:solidFill>
-                  <a:srgbClr val="FF0000"/>
-                </a:solidFill>
-                <a:latin typeface="Consolas" charset="0"/>
-                <a:ea typeface="Consolas" charset="0"/>
-                <a:cs typeface="Consolas" charset="0"/>
-              </a:rPr>
-              <a:t>   void land();</a:t>
+              <a:t>    void land();</a:t>
             </a:r>
           </a:p>
           <a:p>
@@ -4573,6 +4579,31 @@
               </a:rPr>
               <a:t>}</a:t>
             </a:r>
+          </a:p>
+        </p:txBody>
+      </p:sp>
+      <p:sp>
+        <p:nvSpPr>
+          <p:cNvPr id="4" name="Slide Number Placeholder 3"/>
+          <p:cNvSpPr>
+            <a:spLocks noGrp="1"/>
+          </p:cNvSpPr>
+          <p:nvPr>
+            <p:ph type="sldNum" sz="quarter" idx="12"/>
+          </p:nvPr>
+        </p:nvSpPr>
+        <p:spPr/>
+        <p:txBody>
+          <a:bodyPr>
+            <a:normAutofit lnSpcReduction="10000"/>
+          </a:bodyPr>
+          <a:lstStyle/>
+          <a:p>
+            <a:fld id="{4FAB73BC-B049-4115-A692-8D63A059BFB8}" type="slidenum">
+              <a:rPr lang="en-US" smtClean="0"/>
+              <a:t>11</a:t>
+            </a:fld>
+            <a:endParaRPr lang="en-US" dirty="0"/>
           </a:p>
         </p:txBody>
       </p:sp>
@@ -4622,10 +4653,9 @@
           <a:lstStyle/>
           <a:p>
             <a:r>
-              <a:rPr lang="en-US" dirty="0" smtClean="0"/>
+              <a:rPr lang="en-US" dirty="0"/>
               <a:t>Implementing Interfaces</a:t>
             </a:r>
-            <a:endParaRPr lang="en-US" dirty="0"/>
           </a:p>
         </p:txBody>
       </p:sp>
@@ -4647,30 +4677,29 @@
           <a:lstStyle/>
           <a:p>
             <a:r>
-              <a:rPr lang="en-US" sz="2400" dirty="0" smtClean="0"/>
+              <a:rPr lang="en-US" sz="2400" dirty="0"/>
               <a:t>A class can make use of an interface using the </a:t>
             </a:r>
             <a:r>
-              <a:rPr lang="en-US" sz="2400" i="1" dirty="0" smtClean="0"/>
+              <a:rPr lang="en-US" sz="2400" i="1" dirty="0"/>
               <a:t>implements</a:t>
             </a:r>
             <a:r>
-              <a:rPr lang="en-US" sz="2400" dirty="0" smtClean="0"/>
+              <a:rPr lang="en-US" sz="2400" dirty="0"/>
               <a:t> reserved word</a:t>
             </a:r>
           </a:p>
           <a:p>
             <a:r>
-              <a:rPr lang="en-US" sz="2400" dirty="0" smtClean="0"/>
+              <a:rPr lang="en-US" sz="2400" dirty="0"/>
               <a:t>Classes can implement multiple interfaces</a:t>
             </a:r>
           </a:p>
           <a:p>
             <a:r>
-              <a:rPr lang="en-US" sz="2400" dirty="0" smtClean="0"/>
+              <a:rPr lang="en-US" sz="2400" dirty="0"/>
               <a:t>When implementing an interface in a non-abstract class, implementations for declared methods must be provided</a:t>
             </a:r>
-            <a:endParaRPr lang="en-US" sz="2400" dirty="0"/>
           </a:p>
         </p:txBody>
       </p:sp>
@@ -4709,7 +4738,7 @@
               <a:buNone/>
             </a:pPr>
             <a:r>
-              <a:rPr lang="en-US" dirty="0" smtClean="0">
+              <a:rPr lang="en-US" dirty="0">
                 <a:solidFill>
                   <a:srgbClr val="FF0000"/>
                 </a:solidFill>
@@ -4742,18 +4771,7 @@
                 <a:ea typeface="Consolas" charset="0"/>
                 <a:cs typeface="Consolas" charset="0"/>
               </a:rPr>
-              <a:t> </a:t>
-            </a:r>
-            <a:r>
-              <a:rPr lang="en-US" dirty="0" smtClean="0">
-                <a:solidFill>
-                  <a:srgbClr val="FF0000"/>
-                </a:solidFill>
-                <a:latin typeface="Consolas" charset="0"/>
-                <a:ea typeface="Consolas" charset="0"/>
-                <a:cs typeface="Consolas" charset="0"/>
-              </a:rPr>
-              <a:t>   @Override</a:t>
+              <a:t>    @Override</a:t>
             </a:r>
           </a:p>
           <a:p>
@@ -4778,18 +4796,7 @@
                 <a:ea typeface="Consolas" charset="0"/>
                 <a:cs typeface="Consolas" charset="0"/>
               </a:rPr>
-              <a:t> </a:t>
-            </a:r>
-            <a:r>
-              <a:rPr lang="en-US" dirty="0" smtClean="0">
-                <a:solidFill>
-                  <a:srgbClr val="FF0000"/>
-                </a:solidFill>
-                <a:latin typeface="Consolas" charset="0"/>
-                <a:ea typeface="Consolas" charset="0"/>
-                <a:cs typeface="Consolas" charset="0"/>
-              </a:rPr>
-              <a:t>   public void takeoff() {</a:t>
+              <a:t>    public void takeoff() {</a:t>
             </a:r>
           </a:p>
           <a:p>
@@ -4814,18 +4821,7 @@
                 <a:ea typeface="Consolas" charset="0"/>
                 <a:cs typeface="Consolas" charset="0"/>
               </a:rPr>
-              <a:t> </a:t>
-            </a:r>
-            <a:r>
-              <a:rPr lang="en-US" dirty="0" smtClean="0">
-                <a:solidFill>
-                  <a:srgbClr val="FF0000"/>
-                </a:solidFill>
-                <a:latin typeface="Consolas" charset="0"/>
-                <a:ea typeface="Consolas" charset="0"/>
-                <a:cs typeface="Consolas" charset="0"/>
-              </a:rPr>
-              <a:t>       // code for takeoff</a:t>
+              <a:t>        // code for takeoff</a:t>
             </a:r>
           </a:p>
           <a:p>
@@ -4850,18 +4846,7 @@
                 <a:ea typeface="Consolas" charset="0"/>
                 <a:cs typeface="Consolas" charset="0"/>
               </a:rPr>
-              <a:t> </a:t>
-            </a:r>
-            <a:r>
-              <a:rPr lang="en-US" dirty="0" smtClean="0">
-                <a:solidFill>
-                  <a:srgbClr val="FF0000"/>
-                </a:solidFill>
-                <a:latin typeface="Consolas" charset="0"/>
-                <a:ea typeface="Consolas" charset="0"/>
-                <a:cs typeface="Consolas" charset="0"/>
-              </a:rPr>
-              <a:t>   }</a:t>
+              <a:t>    }</a:t>
             </a:r>
           </a:p>
           <a:p>
@@ -4878,7 +4863,7 @@
               <a:buNone/>
             </a:pPr>
             <a:r>
-              <a:rPr lang="en-US" dirty="0" smtClean="0">
+              <a:rPr lang="en-US" dirty="0">
                 <a:solidFill>
                   <a:srgbClr val="FF0000"/>
                 </a:solidFill>
@@ -4911,29 +4896,7 @@
                 <a:ea typeface="Consolas" charset="0"/>
                 <a:cs typeface="Consolas" charset="0"/>
               </a:rPr>
-              <a:t> </a:t>
-            </a:r>
-            <a:r>
-              <a:rPr lang="en-US" dirty="0" smtClean="0">
-                <a:solidFill>
-                  <a:srgbClr val="FF0000"/>
-                </a:solidFill>
-                <a:latin typeface="Consolas" charset="0"/>
-                <a:ea typeface="Consolas" charset="0"/>
-                <a:cs typeface="Consolas" charset="0"/>
-              </a:rPr>
-              <a:t>   @</a:t>
-            </a:r>
-            <a:r>
-              <a:rPr lang="en-US" dirty="0">
-                <a:solidFill>
-                  <a:srgbClr val="FF0000"/>
-                </a:solidFill>
-                <a:latin typeface="Consolas" charset="0"/>
-                <a:ea typeface="Consolas" charset="0"/>
-                <a:cs typeface="Consolas" charset="0"/>
-              </a:rPr>
-              <a:t>Override</a:t>
+              <a:t>    @Override</a:t>
             </a:r>
           </a:p>
           <a:p>
@@ -4958,29 +4921,7 @@
                 <a:ea typeface="Consolas" charset="0"/>
                 <a:cs typeface="Consolas" charset="0"/>
               </a:rPr>
-              <a:t>    public void </a:t>
-            </a:r>
-            <a:r>
-              <a:rPr lang="en-US" dirty="0" smtClean="0">
-                <a:solidFill>
-                  <a:srgbClr val="FF0000"/>
-                </a:solidFill>
-                <a:latin typeface="Consolas" charset="0"/>
-                <a:ea typeface="Consolas" charset="0"/>
-                <a:cs typeface="Consolas" charset="0"/>
-              </a:rPr>
-              <a:t>fly() </a:t>
-            </a:r>
-            <a:r>
-              <a:rPr lang="en-US" dirty="0">
-                <a:solidFill>
-                  <a:srgbClr val="FF0000"/>
-                </a:solidFill>
-                <a:latin typeface="Consolas" charset="0"/>
-                <a:ea typeface="Consolas" charset="0"/>
-                <a:cs typeface="Consolas" charset="0"/>
-              </a:rPr>
-              <a:t>{</a:t>
+              <a:t>    public void fly() {</a:t>
             </a:r>
           </a:p>
           <a:p>
@@ -5005,27 +4946,8 @@
                 <a:ea typeface="Consolas" charset="0"/>
                 <a:cs typeface="Consolas" charset="0"/>
               </a:rPr>
-              <a:t>        // code for </a:t>
-            </a:r>
-            <a:r>
-              <a:rPr lang="en-US" dirty="0" smtClean="0">
-                <a:solidFill>
-                  <a:srgbClr val="FF0000"/>
-                </a:solidFill>
-                <a:latin typeface="Consolas" charset="0"/>
-                <a:ea typeface="Consolas" charset="0"/>
-                <a:cs typeface="Consolas" charset="0"/>
-              </a:rPr>
-              <a:t>fly</a:t>
-            </a:r>
-            <a:endParaRPr lang="en-US" dirty="0">
-              <a:solidFill>
-                <a:srgbClr val="FF0000"/>
-              </a:solidFill>
-              <a:latin typeface="Consolas" charset="0"/>
-              <a:ea typeface="Consolas" charset="0"/>
-              <a:cs typeface="Consolas" charset="0"/>
-            </a:endParaRPr>
+              <a:t>        // code for fly</a:t>
+            </a:r>
           </a:p>
           <a:p>
             <a:pPr marL="0" indent="0">
@@ -5049,18 +4971,7 @@
                 <a:ea typeface="Consolas" charset="0"/>
                 <a:cs typeface="Consolas" charset="0"/>
               </a:rPr>
-              <a:t>    </a:t>
-            </a:r>
-            <a:r>
-              <a:rPr lang="en-US" dirty="0" smtClean="0">
-                <a:solidFill>
-                  <a:srgbClr val="FF0000"/>
-                </a:solidFill>
-                <a:latin typeface="Consolas" charset="0"/>
-                <a:ea typeface="Consolas" charset="0"/>
-                <a:cs typeface="Consolas" charset="0"/>
-              </a:rPr>
-              <a:t>}</a:t>
+              <a:t>    }</a:t>
             </a:r>
           </a:p>
           <a:p>
@@ -5085,18 +4996,7 @@
                 <a:ea typeface="Consolas" charset="0"/>
                 <a:cs typeface="Consolas" charset="0"/>
               </a:rPr>
-              <a:t> </a:t>
-            </a:r>
-            <a:r>
-              <a:rPr lang="en-US" dirty="0" smtClean="0">
-                <a:solidFill>
-                  <a:srgbClr val="FF0000"/>
-                </a:solidFill>
-                <a:latin typeface="Consolas" charset="0"/>
-                <a:ea typeface="Consolas" charset="0"/>
-                <a:cs typeface="Consolas" charset="0"/>
-              </a:rPr>
-              <a:t>   </a:t>
+              <a:t>    </a:t>
             </a:r>
           </a:p>
           <a:p>
@@ -5121,29 +5021,7 @@
                 <a:ea typeface="Consolas" charset="0"/>
                 <a:cs typeface="Consolas" charset="0"/>
               </a:rPr>
-              <a:t> </a:t>
-            </a:r>
-            <a:r>
-              <a:rPr lang="en-US" dirty="0" smtClean="0">
-                <a:solidFill>
-                  <a:srgbClr val="FF0000"/>
-                </a:solidFill>
-                <a:latin typeface="Consolas" charset="0"/>
-                <a:ea typeface="Consolas" charset="0"/>
-                <a:cs typeface="Consolas" charset="0"/>
-              </a:rPr>
-              <a:t>   @</a:t>
-            </a:r>
-            <a:r>
-              <a:rPr lang="en-US" dirty="0">
-                <a:solidFill>
-                  <a:srgbClr val="FF0000"/>
-                </a:solidFill>
-                <a:latin typeface="Consolas" charset="0"/>
-                <a:ea typeface="Consolas" charset="0"/>
-                <a:cs typeface="Consolas" charset="0"/>
-              </a:rPr>
-              <a:t>Override</a:t>
+              <a:t>    @Override</a:t>
             </a:r>
           </a:p>
           <a:p>
@@ -5168,29 +5046,7 @@
                 <a:ea typeface="Consolas" charset="0"/>
                 <a:cs typeface="Consolas" charset="0"/>
               </a:rPr>
-              <a:t>    public void </a:t>
-            </a:r>
-            <a:r>
-              <a:rPr lang="en-US" dirty="0" smtClean="0">
-                <a:solidFill>
-                  <a:srgbClr val="FF0000"/>
-                </a:solidFill>
-                <a:latin typeface="Consolas" charset="0"/>
-                <a:ea typeface="Consolas" charset="0"/>
-                <a:cs typeface="Consolas" charset="0"/>
-              </a:rPr>
-              <a:t>land() </a:t>
-            </a:r>
-            <a:r>
-              <a:rPr lang="en-US" dirty="0">
-                <a:solidFill>
-                  <a:srgbClr val="FF0000"/>
-                </a:solidFill>
-                <a:latin typeface="Consolas" charset="0"/>
-                <a:ea typeface="Consolas" charset="0"/>
-                <a:cs typeface="Consolas" charset="0"/>
-              </a:rPr>
-              <a:t>{</a:t>
+              <a:t>    public void land() {</a:t>
             </a:r>
           </a:p>
           <a:p>
@@ -5215,27 +5071,8 @@
                 <a:ea typeface="Consolas" charset="0"/>
                 <a:cs typeface="Consolas" charset="0"/>
               </a:rPr>
-              <a:t>        // code for </a:t>
-            </a:r>
-            <a:r>
-              <a:rPr lang="en-US" dirty="0" smtClean="0">
-                <a:solidFill>
-                  <a:srgbClr val="FF0000"/>
-                </a:solidFill>
-                <a:latin typeface="Consolas" charset="0"/>
-                <a:ea typeface="Consolas" charset="0"/>
-                <a:cs typeface="Consolas" charset="0"/>
-              </a:rPr>
-              <a:t>land</a:t>
-            </a:r>
-            <a:endParaRPr lang="en-US" dirty="0">
-              <a:solidFill>
-                <a:srgbClr val="FF0000"/>
-              </a:solidFill>
-              <a:latin typeface="Consolas" charset="0"/>
-              <a:ea typeface="Consolas" charset="0"/>
-              <a:cs typeface="Consolas" charset="0"/>
-            </a:endParaRPr>
+              <a:t>        // code for land</a:t>
+            </a:r>
           </a:p>
           <a:p>
             <a:pPr marL="0" indent="0">
@@ -5259,18 +5096,7 @@
                 <a:ea typeface="Consolas" charset="0"/>
                 <a:cs typeface="Consolas" charset="0"/>
               </a:rPr>
-              <a:t>    </a:t>
-            </a:r>
-            <a:r>
-              <a:rPr lang="en-US" dirty="0" smtClean="0">
-                <a:solidFill>
-                  <a:srgbClr val="FF0000"/>
-                </a:solidFill>
-                <a:latin typeface="Consolas" charset="0"/>
-                <a:ea typeface="Consolas" charset="0"/>
-                <a:cs typeface="Consolas" charset="0"/>
-              </a:rPr>
-              <a:t>}</a:t>
+              <a:t>    }</a:t>
             </a:r>
           </a:p>
           <a:p>
@@ -5297,6 +5123,31 @@
               </a:rPr>
               <a:t>}</a:t>
             </a:r>
+          </a:p>
+        </p:txBody>
+      </p:sp>
+      <p:sp>
+        <p:nvSpPr>
+          <p:cNvPr id="4" name="Slide Number Placeholder 3"/>
+          <p:cNvSpPr>
+            <a:spLocks noGrp="1"/>
+          </p:cNvSpPr>
+          <p:nvPr>
+            <p:ph type="sldNum" sz="quarter" idx="12"/>
+          </p:nvPr>
+        </p:nvSpPr>
+        <p:spPr/>
+        <p:txBody>
+          <a:bodyPr>
+            <a:normAutofit lnSpcReduction="10000"/>
+          </a:bodyPr>
+          <a:lstStyle/>
+          <a:p>
+            <a:fld id="{4FAB73BC-B049-4115-A692-8D63A059BFB8}" type="slidenum">
+              <a:rPr lang="en-US" smtClean="0"/>
+              <a:t>12</a:t>
+            </a:fld>
+            <a:endParaRPr lang="en-US" dirty="0"/>
           </a:p>
         </p:txBody>
       </p:sp>
@@ -5346,10 +5197,9 @@
           <a:lstStyle/>
           <a:p>
             <a:r>
-              <a:rPr lang="en-US" dirty="0" smtClean="0"/>
+              <a:rPr lang="en-US" dirty="0"/>
               <a:t>Multiple Inheritance</a:t>
             </a:r>
-            <a:endParaRPr lang="en-US" dirty="0"/>
           </a:p>
         </p:txBody>
       </p:sp>
@@ -5382,6 +5232,31 @@
           </a:xfrm>
         </p:spPr>
       </p:pic>
+      <p:sp>
+        <p:nvSpPr>
+          <p:cNvPr id="2" name="Slide Number Placeholder 1"/>
+          <p:cNvSpPr>
+            <a:spLocks noGrp="1"/>
+          </p:cNvSpPr>
+          <p:nvPr>
+            <p:ph type="sldNum" sz="quarter" idx="12"/>
+          </p:nvPr>
+        </p:nvSpPr>
+        <p:spPr/>
+        <p:txBody>
+          <a:bodyPr>
+            <a:normAutofit lnSpcReduction="10000"/>
+          </a:bodyPr>
+          <a:lstStyle/>
+          <a:p>
+            <a:fld id="{4FAB73BC-B049-4115-A692-8D63A059BFB8}" type="slidenum">
+              <a:rPr lang="en-US" smtClean="0"/>
+              <a:t>13</a:t>
+            </a:fld>
+            <a:endParaRPr lang="en-US" dirty="0"/>
+          </a:p>
+        </p:txBody>
+      </p:sp>
     </p:spTree>
     <p:extLst>
       <p:ext uri="{BB962C8B-B14F-4D97-AF65-F5344CB8AC3E}">
@@ -5428,10 +5303,9 @@
           <a:lstStyle/>
           <a:p>
             <a:r>
-              <a:rPr lang="en-US" dirty="0" smtClean="0"/>
+              <a:rPr lang="en-US" dirty="0"/>
               <a:t>Multiple Inheritance</a:t>
             </a:r>
-            <a:endParaRPr lang="en-US" dirty="0"/>
           </a:p>
         </p:txBody>
       </p:sp>
@@ -5453,29 +5327,54 @@
           <a:lstStyle/>
           <a:p>
             <a:r>
-              <a:rPr lang="en-US" sz="3200" dirty="0" smtClean="0"/>
+              <a:rPr lang="en-US" sz="3200" dirty="0"/>
               <a:t>Java doesn’t support multiple implementation inheritance</a:t>
             </a:r>
           </a:p>
           <a:p>
             <a:r>
-              <a:rPr lang="en-US" sz="3200" dirty="0" smtClean="0"/>
+              <a:rPr lang="en-US" sz="3200" dirty="0"/>
               <a:t>Java does support multiple interface inheritance</a:t>
             </a:r>
           </a:p>
           <a:p>
             <a:r>
-              <a:rPr lang="en-US" sz="3200" dirty="0" smtClean="0"/>
+              <a:rPr lang="en-US" sz="3200" dirty="0"/>
               <a:t>Specify multiple interfaces using a comma-separated list of interfaces after </a:t>
             </a:r>
             <a:r>
-              <a:rPr lang="en-US" sz="3200" dirty="0" smtClean="0">
+              <a:rPr lang="en-US" sz="3200" dirty="0">
                 <a:latin typeface="Consolas" charset="0"/>
                 <a:ea typeface="Consolas" charset="0"/>
                 <a:cs typeface="Consolas" charset="0"/>
               </a:rPr>
               <a:t>implements</a:t>
             </a:r>
+          </a:p>
+        </p:txBody>
+      </p:sp>
+      <p:sp>
+        <p:nvSpPr>
+          <p:cNvPr id="4" name="Slide Number Placeholder 3"/>
+          <p:cNvSpPr>
+            <a:spLocks noGrp="1"/>
+          </p:cNvSpPr>
+          <p:nvPr>
+            <p:ph type="sldNum" sz="quarter" idx="12"/>
+          </p:nvPr>
+        </p:nvSpPr>
+        <p:spPr/>
+        <p:txBody>
+          <a:bodyPr>
+            <a:normAutofit lnSpcReduction="10000"/>
+          </a:bodyPr>
+          <a:lstStyle/>
+          <a:p>
+            <a:fld id="{4FAB73BC-B049-4115-A692-8D63A059BFB8}" type="slidenum">
+              <a:rPr lang="en-US" smtClean="0"/>
+              <a:t>14</a:t>
+            </a:fld>
+            <a:endParaRPr lang="en-US" dirty="0"/>
           </a:p>
         </p:txBody>
       </p:sp>
@@ -5525,10 +5424,9 @@
           <a:lstStyle/>
           <a:p>
             <a:r>
-              <a:rPr lang="en-US" dirty="0" smtClean="0"/>
+              <a:rPr lang="en-US" dirty="0"/>
               <a:t>Decoupling Interface from Implementation</a:t>
             </a:r>
-            <a:endParaRPr lang="en-US" dirty="0"/>
           </a:p>
         </p:txBody>
       </p:sp>
@@ -5550,29 +5448,50 @@
           <a:lstStyle/>
           <a:p>
             <a:r>
-              <a:rPr lang="en-US" sz="3200" smtClean="0"/>
+              <a:rPr lang="en-US" sz="3200"/>
               <a:t>Implementation </a:t>
             </a:r>
             <a:r>
-              <a:rPr lang="en-US" sz="3200" dirty="0" smtClean="0"/>
-              <a:t>inheritance </a:t>
-            </a:r>
-            <a:r>
-              <a:rPr lang="en-US" sz="3200" dirty="0" smtClean="0"/>
-              <a:t>provides ability to reuse code</a:t>
-            </a:r>
-          </a:p>
-          <a:p>
-            <a:r>
-              <a:rPr lang="en-US" sz="3200" dirty="0" smtClean="0"/>
+              <a:rPr lang="en-US" sz="3200" dirty="0"/>
+              <a:t>inheritance provides ability to reuse code</a:t>
+            </a:r>
+          </a:p>
+          <a:p>
+            <a:r>
+              <a:rPr lang="en-US" sz="3200" dirty="0"/>
               <a:t>Interface inheritance allows us to separate publically accessible methods from code that supports those methods</a:t>
             </a:r>
           </a:p>
           <a:p>
             <a:r>
-              <a:rPr lang="en-US" sz="3200" dirty="0" smtClean="0"/>
+              <a:rPr lang="en-US" sz="3200" dirty="0"/>
               <a:t>Allows us to write flexible code that supports different classes</a:t>
             </a:r>
+          </a:p>
+        </p:txBody>
+      </p:sp>
+      <p:sp>
+        <p:nvSpPr>
+          <p:cNvPr id="4" name="Slide Number Placeholder 3"/>
+          <p:cNvSpPr>
+            <a:spLocks noGrp="1"/>
+          </p:cNvSpPr>
+          <p:nvPr>
+            <p:ph type="sldNum" sz="quarter" idx="12"/>
+          </p:nvPr>
+        </p:nvSpPr>
+        <p:spPr/>
+        <p:txBody>
+          <a:bodyPr>
+            <a:normAutofit lnSpcReduction="10000"/>
+          </a:bodyPr>
+          <a:lstStyle/>
+          <a:p>
+            <a:fld id="{4FAB73BC-B049-4115-A692-8D63A059BFB8}" type="slidenum">
+              <a:rPr lang="en-US" smtClean="0"/>
+              <a:t>15</a:t>
+            </a:fld>
+            <a:endParaRPr lang="en-US" dirty="0"/>
           </a:p>
         </p:txBody>
       </p:sp>
@@ -5622,10 +5541,9 @@
           <a:lstStyle/>
           <a:p>
             <a:r>
-              <a:rPr lang="en-US" dirty="0" smtClean="0"/>
+              <a:rPr lang="en-US" dirty="0"/>
               <a:t>Extending Interfaces</a:t>
             </a:r>
-            <a:endParaRPr lang="en-US" dirty="0"/>
           </a:p>
         </p:txBody>
       </p:sp>
@@ -5647,22 +5565,22 @@
           <a:lstStyle/>
           <a:p>
             <a:r>
-              <a:rPr lang="en-US" sz="3600" dirty="0" smtClean="0"/>
+              <a:rPr lang="en-US" sz="3600" dirty="0"/>
               <a:t>Like classes, we can can extended interfaces and create </a:t>
             </a:r>
             <a:r>
-              <a:rPr lang="en-US" sz="3600" dirty="0" err="1" smtClean="0"/>
+              <a:rPr lang="en-US" sz="3600" dirty="0" err="1"/>
               <a:t>subinterfaces</a:t>
             </a:r>
-            <a:endParaRPr lang="en-US" sz="3600" dirty="0" smtClean="0"/>
-          </a:p>
-          <a:p>
-            <a:r>
-              <a:rPr lang="en-US" sz="3600" dirty="0" smtClean="0"/>
+            <a:endParaRPr lang="en-US" sz="3600" dirty="0"/>
+          </a:p>
+          <a:p>
+            <a:r>
+              <a:rPr lang="en-US" sz="3600" dirty="0"/>
               <a:t>Use the </a:t>
             </a:r>
             <a:r>
-              <a:rPr lang="en-US" sz="3600" dirty="0" smtClean="0">
+              <a:rPr lang="en-US" sz="3600" dirty="0">
                 <a:latin typeface="Consolas" charset="0"/>
                 <a:ea typeface="Consolas" charset="0"/>
                 <a:cs typeface="Consolas" charset="0"/>
@@ -5670,15 +5588,40 @@
               <a:t>extends</a:t>
             </a:r>
             <a:r>
-              <a:rPr lang="en-US" sz="3600" dirty="0" smtClean="0"/>
+              <a:rPr lang="en-US" sz="3600" dirty="0"/>
               <a:t> reserved word</a:t>
             </a:r>
           </a:p>
           <a:p>
             <a:r>
-              <a:rPr lang="en-US" sz="3600" dirty="0" smtClean="0"/>
+              <a:rPr lang="en-US" sz="3600" dirty="0"/>
               <a:t>An interface cannot implement another interface because we can’t specify implementation details in an interface</a:t>
             </a:r>
+          </a:p>
+        </p:txBody>
+      </p:sp>
+      <p:sp>
+        <p:nvSpPr>
+          <p:cNvPr id="4" name="Slide Number Placeholder 3"/>
+          <p:cNvSpPr>
+            <a:spLocks noGrp="1"/>
+          </p:cNvSpPr>
+          <p:nvPr>
+            <p:ph type="sldNum" sz="quarter" idx="12"/>
+          </p:nvPr>
+        </p:nvSpPr>
+        <p:spPr/>
+        <p:txBody>
+          <a:bodyPr>
+            <a:normAutofit lnSpcReduction="10000"/>
+          </a:bodyPr>
+          <a:lstStyle/>
+          <a:p>
+            <a:fld id="{4FAB73BC-B049-4115-A692-8D63A059BFB8}" type="slidenum">
+              <a:rPr lang="en-US" smtClean="0"/>
+              <a:t>16</a:t>
+            </a:fld>
+            <a:endParaRPr lang="en-US" dirty="0"/>
           </a:p>
         </p:txBody>
       </p:sp>
@@ -5728,10 +5671,9 @@
           <a:lstStyle/>
           <a:p>
             <a:r>
-              <a:rPr lang="en-US" dirty="0" smtClean="0"/>
+              <a:rPr lang="en-US" dirty="0"/>
               <a:t>Standard Library</a:t>
             </a:r>
-            <a:endParaRPr lang="en-US" dirty="0"/>
           </a:p>
         </p:txBody>
       </p:sp>
@@ -5753,21 +5695,46 @@
           <a:lstStyle/>
           <a:p>
             <a:r>
-              <a:rPr lang="en-US" sz="3600" dirty="0" smtClean="0"/>
+              <a:rPr lang="en-US" sz="3600" dirty="0"/>
               <a:t>Standard library contains many interfaces</a:t>
             </a:r>
           </a:p>
           <a:p>
             <a:r>
-              <a:rPr lang="en-US" sz="3600" dirty="0" smtClean="0"/>
+              <a:rPr lang="en-US" sz="3600" dirty="0"/>
               <a:t>We’ve worked with examples from the Collections framework: List, Set, Map</a:t>
             </a:r>
           </a:p>
           <a:p>
             <a:r>
-              <a:rPr lang="en-US" sz="3600" dirty="0" smtClean="0"/>
+              <a:rPr lang="en-US" sz="3600" dirty="0"/>
               <a:t>Implementing Comparable allows us to sort lists of objects</a:t>
             </a:r>
+          </a:p>
+        </p:txBody>
+      </p:sp>
+      <p:sp>
+        <p:nvSpPr>
+          <p:cNvPr id="4" name="Slide Number Placeholder 3"/>
+          <p:cNvSpPr>
+            <a:spLocks noGrp="1"/>
+          </p:cNvSpPr>
+          <p:nvPr>
+            <p:ph type="sldNum" sz="quarter" idx="12"/>
+          </p:nvPr>
+        </p:nvSpPr>
+        <p:spPr/>
+        <p:txBody>
+          <a:bodyPr>
+            <a:normAutofit lnSpcReduction="10000"/>
+          </a:bodyPr>
+          <a:lstStyle/>
+          <a:p>
+            <a:fld id="{4FAB73BC-B049-4115-A692-8D63A059BFB8}" type="slidenum">
+              <a:rPr lang="en-US" smtClean="0"/>
+              <a:t>17</a:t>
+            </a:fld>
+            <a:endParaRPr lang="en-US" dirty="0"/>
           </a:p>
         </p:txBody>
       </p:sp>
@@ -5817,10 +5784,9 @@
           <a:lstStyle/>
           <a:p>
             <a:r>
-              <a:rPr lang="en-US" dirty="0" smtClean="0"/>
+              <a:rPr lang="en-US" dirty="0"/>
               <a:t>Exercise 2</a:t>
             </a:r>
-            <a:endParaRPr lang="en-US" dirty="0"/>
           </a:p>
         </p:txBody>
       </p:sp>
@@ -5868,6 +5834,31 @@
               <a:rPr lang="en-US" sz="3200" dirty="0"/>
               <a:t> method that displays contact information.</a:t>
             </a:r>
+          </a:p>
+        </p:txBody>
+      </p:sp>
+      <p:sp>
+        <p:nvSpPr>
+          <p:cNvPr id="4" name="Slide Number Placeholder 3"/>
+          <p:cNvSpPr>
+            <a:spLocks noGrp="1"/>
+          </p:cNvSpPr>
+          <p:nvPr>
+            <p:ph type="sldNum" sz="quarter" idx="12"/>
+          </p:nvPr>
+        </p:nvSpPr>
+        <p:spPr/>
+        <p:txBody>
+          <a:bodyPr>
+            <a:normAutofit lnSpcReduction="10000"/>
+          </a:bodyPr>
+          <a:lstStyle/>
+          <a:p>
+            <a:fld id="{4FAB73BC-B049-4115-A692-8D63A059BFB8}" type="slidenum">
+              <a:rPr lang="en-US" smtClean="0"/>
+              <a:t>18</a:t>
+            </a:fld>
+            <a:endParaRPr lang="en-US" dirty="0"/>
           </a:p>
         </p:txBody>
       </p:sp>
@@ -5917,10 +5908,9 @@
           <a:lstStyle/>
           <a:p>
             <a:r>
-              <a:rPr lang="en-US" dirty="0" smtClean="0"/>
+              <a:rPr lang="en-US" dirty="0"/>
               <a:t>Corresponding Text</a:t>
             </a:r>
-            <a:endParaRPr lang="en-US" dirty="0"/>
           </a:p>
         </p:txBody>
       </p:sp>
@@ -5942,14 +5932,39 @@
           <a:lstStyle/>
           <a:p>
             <a:r>
-              <a:rPr lang="en-US" sz="2800" i="1" dirty="0" smtClean="0"/>
+              <a:rPr lang="en-US" sz="2800" i="1" dirty="0"/>
               <a:t>Learn Java for Android Development</a:t>
             </a:r>
             <a:r>
-              <a:rPr lang="en-US" sz="2800" dirty="0" smtClean="0"/>
+              <a:rPr lang="en-US" sz="2800" dirty="0"/>
               <a:t>, pp. 167-169, 174-183</a:t>
             </a:r>
             <a:endParaRPr lang="en-US" sz="2800" i="1" dirty="0"/>
+          </a:p>
+        </p:txBody>
+      </p:sp>
+      <p:sp>
+        <p:nvSpPr>
+          <p:cNvPr id="4" name="Slide Number Placeholder 3"/>
+          <p:cNvSpPr>
+            <a:spLocks noGrp="1"/>
+          </p:cNvSpPr>
+          <p:nvPr>
+            <p:ph type="sldNum" sz="quarter" idx="12"/>
+          </p:nvPr>
+        </p:nvSpPr>
+        <p:spPr/>
+        <p:txBody>
+          <a:bodyPr>
+            <a:normAutofit lnSpcReduction="10000"/>
+          </a:bodyPr>
+          <a:lstStyle/>
+          <a:p>
+            <a:fld id="{4FAB73BC-B049-4115-A692-8D63A059BFB8}" type="slidenum">
+              <a:rPr lang="en-US" smtClean="0"/>
+              <a:t>2</a:t>
+            </a:fld>
+            <a:endParaRPr lang="en-US" dirty="0"/>
           </a:p>
         </p:txBody>
       </p:sp>
@@ -5999,29 +6014,53 @@
           <a:lstStyle/>
           <a:p>
             <a:r>
-              <a:rPr lang="en-US" dirty="0" smtClean="0"/>
+              <a:rPr lang="en-US" dirty="0"/>
               <a:t>Abstract Classes</a:t>
             </a:r>
+          </a:p>
+        </p:txBody>
+      </p:sp>
+      <p:sp>
+        <p:nvSpPr>
+          <p:cNvPr id="5" name="Text Placeholder 4"/>
+          <p:cNvSpPr>
+            <a:spLocks noGrp="1"/>
+          </p:cNvSpPr>
+          <p:nvPr>
+            <p:ph type="body" idx="1"/>
+          </p:nvPr>
+        </p:nvSpPr>
+        <p:spPr/>
+        <p:txBody>
+          <a:bodyPr/>
+          <a:lstStyle/>
+          <a:p>
+            <a:endParaRPr lang="en-US"/>
+          </a:p>
+        </p:txBody>
+      </p:sp>
+      <p:sp>
+        <p:nvSpPr>
+          <p:cNvPr id="2" name="Slide Number Placeholder 1"/>
+          <p:cNvSpPr>
+            <a:spLocks noGrp="1"/>
+          </p:cNvSpPr>
+          <p:nvPr>
+            <p:ph type="sldNum" sz="quarter" idx="12"/>
+          </p:nvPr>
+        </p:nvSpPr>
+        <p:spPr/>
+        <p:txBody>
+          <a:bodyPr>
+            <a:normAutofit lnSpcReduction="10000"/>
+          </a:bodyPr>
+          <a:lstStyle/>
+          <a:p>
+            <a:fld id="{4FAB73BC-B049-4115-A692-8D63A059BFB8}" type="slidenum">
+              <a:rPr lang="en-US" smtClean="0"/>
+              <a:t>3</a:t>
+            </a:fld>
             <a:endParaRPr lang="en-US" dirty="0"/>
-          </a:p>
-        </p:txBody>
-      </p:sp>
-      <p:sp>
-        <p:nvSpPr>
-          <p:cNvPr id="5" name="Text Placeholder 4"/>
-          <p:cNvSpPr>
-            <a:spLocks noGrp="1"/>
-          </p:cNvSpPr>
-          <p:nvPr>
-            <p:ph type="body" idx="1"/>
-          </p:nvPr>
-        </p:nvSpPr>
-        <p:spPr/>
-        <p:txBody>
-          <a:bodyPr/>
-          <a:lstStyle/>
-          <a:p>
-            <a:endParaRPr lang="en-US"/>
           </a:p>
         </p:txBody>
       </p:sp>
@@ -6071,10 +6110,9 @@
           <a:lstStyle/>
           <a:p>
             <a:r>
-              <a:rPr lang="en-US" dirty="0" smtClean="0"/>
+              <a:rPr lang="en-US" dirty="0"/>
               <a:t>Abstract Methods</a:t>
             </a:r>
-            <a:endParaRPr lang="en-US" dirty="0"/>
           </a:p>
         </p:txBody>
       </p:sp>
@@ -6096,35 +6134,56 @@
           <a:lstStyle/>
           <a:p>
             <a:r>
-              <a:rPr lang="en-US" sz="3200" dirty="0" smtClean="0"/>
+              <a:rPr lang="en-US" sz="3200" dirty="0"/>
               <a:t>An </a:t>
             </a:r>
             <a:r>
               <a:rPr lang="en-US" sz="3200" b="1" dirty="0"/>
-              <a:t>a</a:t>
-            </a:r>
-            <a:r>
-              <a:rPr lang="en-US" sz="3200" b="1" dirty="0" smtClean="0"/>
-              <a:t>bstract method </a:t>
-            </a:r>
-            <a:r>
-              <a:rPr lang="en-US" sz="3200" dirty="0" smtClean="0"/>
+              <a:t>abstract method </a:t>
+            </a:r>
+            <a:r>
+              <a:rPr lang="en-US" sz="3200" dirty="0"/>
               <a:t>is a declared method without a body/implementation.</a:t>
             </a:r>
           </a:p>
           <a:p>
             <a:r>
-              <a:rPr lang="en-US" sz="3200" dirty="0" smtClean="0"/>
+              <a:rPr lang="en-US" sz="3200" dirty="0"/>
               <a:t>Declared by prefixing the method header with the </a:t>
             </a:r>
             <a:r>
-              <a:rPr lang="en-US" sz="3200" i="1" dirty="0" smtClean="0"/>
+              <a:rPr lang="en-US" sz="3200" i="1" dirty="0"/>
               <a:t>abstract</a:t>
             </a:r>
             <a:r>
-              <a:rPr lang="en-US" sz="3200" dirty="0" smtClean="0"/>
+              <a:rPr lang="en-US" sz="3200" dirty="0"/>
               <a:t> reserved word.</a:t>
             </a:r>
+          </a:p>
+        </p:txBody>
+      </p:sp>
+      <p:sp>
+        <p:nvSpPr>
+          <p:cNvPr id="4" name="Slide Number Placeholder 3"/>
+          <p:cNvSpPr>
+            <a:spLocks noGrp="1"/>
+          </p:cNvSpPr>
+          <p:nvPr>
+            <p:ph type="sldNum" sz="quarter" idx="12"/>
+          </p:nvPr>
+        </p:nvSpPr>
+        <p:spPr/>
+        <p:txBody>
+          <a:bodyPr>
+            <a:normAutofit lnSpcReduction="10000"/>
+          </a:bodyPr>
+          <a:lstStyle/>
+          <a:p>
+            <a:fld id="{4FAB73BC-B049-4115-A692-8D63A059BFB8}" type="slidenum">
+              <a:rPr lang="en-US" smtClean="0"/>
+              <a:t>4</a:t>
+            </a:fld>
+            <a:endParaRPr lang="en-US" dirty="0"/>
           </a:p>
         </p:txBody>
       </p:sp>
@@ -6174,10 +6233,9 @@
           <a:lstStyle/>
           <a:p>
             <a:r>
-              <a:rPr lang="en-US" dirty="0" smtClean="0"/>
+              <a:rPr lang="en-US" dirty="0"/>
               <a:t>Abstract Classes</a:t>
             </a:r>
-            <a:endParaRPr lang="en-US" dirty="0"/>
           </a:p>
         </p:txBody>
       </p:sp>
@@ -6199,50 +6257,74 @@
           <a:lstStyle/>
           <a:p>
             <a:r>
-              <a:rPr lang="en-US" sz="2000" dirty="0" smtClean="0"/>
+              <a:rPr lang="en-US" sz="2000" dirty="0"/>
               <a:t>An </a:t>
             </a:r>
             <a:r>
-              <a:rPr lang="en-US" sz="2000" b="1" dirty="0" smtClean="0"/>
+              <a:rPr lang="en-US" sz="2000" b="1" dirty="0"/>
               <a:t>abstract class </a:t>
             </a:r>
             <a:r>
-              <a:rPr lang="en-US" sz="2000" dirty="0" smtClean="0"/>
+              <a:rPr lang="en-US" sz="2000" dirty="0"/>
               <a:t>is a class that cannot be used to create objects/instances directly – a subclass must be created.</a:t>
             </a:r>
           </a:p>
           <a:p>
             <a:r>
-              <a:rPr lang="en-US" sz="2000" dirty="0" smtClean="0"/>
+              <a:rPr lang="en-US" sz="2000" dirty="0"/>
               <a:t>Can be useful for describing generic categories where subclasses provide specific details. </a:t>
             </a:r>
           </a:p>
           <a:p>
             <a:r>
-              <a:rPr lang="en-US" sz="2000" dirty="0" smtClean="0"/>
+              <a:rPr lang="en-US" sz="2000" dirty="0"/>
               <a:t>An abstract class may or may not include abstract methods.</a:t>
             </a:r>
           </a:p>
           <a:p>
             <a:r>
-              <a:rPr lang="en-US" sz="2000" dirty="0" smtClean="0"/>
+              <a:rPr lang="en-US" sz="2000" dirty="0"/>
               <a:t>Any non-abstract subclasses must provide implementations for abstract methods. </a:t>
             </a:r>
           </a:p>
           <a:p>
             <a:r>
-              <a:rPr lang="en-US" sz="2000" dirty="0" smtClean="0"/>
+              <a:rPr lang="en-US" sz="2000" dirty="0"/>
               <a:t>Specified by prefixing the class declaration with </a:t>
             </a:r>
             <a:r>
-              <a:rPr lang="en-US" sz="2000" i="1" dirty="0" smtClean="0"/>
+              <a:rPr lang="en-US" sz="2000" i="1" dirty="0"/>
               <a:t>abstract</a:t>
             </a:r>
             <a:r>
-              <a:rPr lang="en-US" sz="2000" dirty="0" smtClean="0"/>
+              <a:rPr lang="en-US" sz="2000" dirty="0"/>
               <a:t>.</a:t>
             </a:r>
-            <a:endParaRPr lang="en-US" sz="2000" dirty="0"/>
+          </a:p>
+        </p:txBody>
+      </p:sp>
+      <p:sp>
+        <p:nvSpPr>
+          <p:cNvPr id="4" name="Slide Number Placeholder 3"/>
+          <p:cNvSpPr>
+            <a:spLocks noGrp="1"/>
+          </p:cNvSpPr>
+          <p:nvPr>
+            <p:ph type="sldNum" sz="quarter" idx="12"/>
+          </p:nvPr>
+        </p:nvSpPr>
+        <p:spPr/>
+        <p:txBody>
+          <a:bodyPr>
+            <a:normAutofit lnSpcReduction="10000"/>
+          </a:bodyPr>
+          <a:lstStyle/>
+          <a:p>
+            <a:fld id="{4FAB73BC-B049-4115-A692-8D63A059BFB8}" type="slidenum">
+              <a:rPr lang="en-US" smtClean="0"/>
+              <a:t>5</a:t>
+            </a:fld>
+            <a:endParaRPr lang="en-US" dirty="0"/>
           </a:p>
         </p:txBody>
       </p:sp>
@@ -6292,10 +6374,9 @@
           <a:lstStyle/>
           <a:p>
             <a:r>
-              <a:rPr lang="en-US" dirty="0" smtClean="0"/>
+              <a:rPr lang="en-US" dirty="0"/>
               <a:t>Exercise 1</a:t>
             </a:r>
-            <a:endParaRPr lang="en-US" dirty="0"/>
           </a:p>
         </p:txBody>
       </p:sp>
@@ -6329,7 +6410,7 @@
             </a:r>
             <a:r>
               <a:rPr lang="en-US" sz="2400" dirty="0"/>
-              <a:t>. Create one class that makes use of the abstract contact class that stores and email address and implements the </a:t>
+              <a:t>. Create one class that makes use of the abstract contact class that stores an email address and implements the </a:t>
             </a:r>
             <a:r>
               <a:rPr lang="en-US" sz="2400" i="1" dirty="0"/>
@@ -6345,15 +6426,7 @@
             </a:r>
             <a:r>
               <a:rPr lang="en-US" sz="2400" dirty="0"/>
-              <a:t> method using the phone </a:t>
-            </a:r>
-            <a:r>
-              <a:rPr lang="en-US" sz="2400" dirty="0" smtClean="0"/>
-              <a:t>number. The </a:t>
-            </a:r>
-            <a:r>
-              <a:rPr lang="en-US" sz="2400" dirty="0"/>
-              <a:t>implementation of the </a:t>
+              <a:t> method using the phone number. The implementation of the </a:t>
             </a:r>
             <a:r>
               <a:rPr lang="en-US" sz="2400" i="1" dirty="0"/>
@@ -6374,6 +6447,31 @@
               <a:t>" or "Calling 123-456-7890".</a:t>
             </a:r>
             <a:endParaRPr lang="en-US" sz="2400" b="1" dirty="0"/>
+          </a:p>
+        </p:txBody>
+      </p:sp>
+      <p:sp>
+        <p:nvSpPr>
+          <p:cNvPr id="4" name="Slide Number Placeholder 3"/>
+          <p:cNvSpPr>
+            <a:spLocks noGrp="1"/>
+          </p:cNvSpPr>
+          <p:nvPr>
+            <p:ph type="sldNum" sz="quarter" idx="12"/>
+          </p:nvPr>
+        </p:nvSpPr>
+        <p:spPr/>
+        <p:txBody>
+          <a:bodyPr>
+            <a:normAutofit lnSpcReduction="10000"/>
+          </a:bodyPr>
+          <a:lstStyle/>
+          <a:p>
+            <a:fld id="{4FAB73BC-B049-4115-A692-8D63A059BFB8}" type="slidenum">
+              <a:rPr lang="en-US" smtClean="0"/>
+              <a:t>6</a:t>
+            </a:fld>
+            <a:endParaRPr lang="en-US" dirty="0"/>
           </a:p>
         </p:txBody>
       </p:sp>
@@ -6423,29 +6521,53 @@
           <a:lstStyle/>
           <a:p>
             <a:r>
-              <a:rPr lang="en-US" dirty="0" smtClean="0"/>
+              <a:rPr lang="en-US" dirty="0"/>
               <a:t>Interfaces</a:t>
             </a:r>
+          </a:p>
+        </p:txBody>
+      </p:sp>
+      <p:sp>
+        <p:nvSpPr>
+          <p:cNvPr id="5" name="Text Placeholder 4"/>
+          <p:cNvSpPr>
+            <a:spLocks noGrp="1"/>
+          </p:cNvSpPr>
+          <p:nvPr>
+            <p:ph type="body" idx="1"/>
+          </p:nvPr>
+        </p:nvSpPr>
+        <p:spPr/>
+        <p:txBody>
+          <a:bodyPr/>
+          <a:lstStyle/>
+          <a:p>
+            <a:endParaRPr lang="en-US"/>
+          </a:p>
+        </p:txBody>
+      </p:sp>
+      <p:sp>
+        <p:nvSpPr>
+          <p:cNvPr id="2" name="Slide Number Placeholder 1"/>
+          <p:cNvSpPr>
+            <a:spLocks noGrp="1"/>
+          </p:cNvSpPr>
+          <p:nvPr>
+            <p:ph type="sldNum" sz="quarter" idx="12"/>
+          </p:nvPr>
+        </p:nvSpPr>
+        <p:spPr/>
+        <p:txBody>
+          <a:bodyPr>
+            <a:normAutofit lnSpcReduction="10000"/>
+          </a:bodyPr>
+          <a:lstStyle/>
+          <a:p>
+            <a:fld id="{4FAB73BC-B049-4115-A692-8D63A059BFB8}" type="slidenum">
+              <a:rPr lang="en-US" smtClean="0"/>
+              <a:t>7</a:t>
+            </a:fld>
             <a:endParaRPr lang="en-US" dirty="0"/>
-          </a:p>
-        </p:txBody>
-      </p:sp>
-      <p:sp>
-        <p:nvSpPr>
-          <p:cNvPr id="5" name="Text Placeholder 4"/>
-          <p:cNvSpPr>
-            <a:spLocks noGrp="1"/>
-          </p:cNvSpPr>
-          <p:nvPr>
-            <p:ph type="body" idx="1"/>
-          </p:nvPr>
-        </p:nvSpPr>
-        <p:spPr/>
-        <p:txBody>
-          <a:bodyPr/>
-          <a:lstStyle/>
-          <a:p>
-            <a:endParaRPr lang="en-US"/>
           </a:p>
         </p:txBody>
       </p:sp>
@@ -6495,10 +6617,9 @@
           <a:lstStyle/>
           <a:p>
             <a:r>
-              <a:rPr lang="en-US" dirty="0" smtClean="0"/>
+              <a:rPr lang="en-US" dirty="0"/>
               <a:t>Interface vs Implementation</a:t>
             </a:r>
-            <a:endParaRPr lang="en-US" dirty="0"/>
           </a:p>
         </p:txBody>
       </p:sp>
@@ -6520,21 +6641,46 @@
           <a:lstStyle/>
           <a:p>
             <a:r>
-              <a:rPr lang="en-US" sz="2400" dirty="0" smtClean="0"/>
+              <a:rPr lang="en-US" sz="2400" dirty="0"/>
               <a:t>Class have both an interface and an implementation</a:t>
             </a:r>
           </a:p>
           <a:p>
             <a:r>
-              <a:rPr lang="en-US" sz="2400" dirty="0" smtClean="0"/>
+              <a:rPr lang="en-US" sz="2400" dirty="0"/>
               <a:t>A class’s interface consists of methods and fields that are available to other objects</a:t>
             </a:r>
           </a:p>
           <a:p>
             <a:r>
-              <a:rPr lang="en-US" sz="2400" dirty="0" smtClean="0"/>
+              <a:rPr lang="en-US" sz="2400" dirty="0"/>
               <a:t>A class’s implementation consists of code that provides functionality to the interface</a:t>
             </a:r>
+          </a:p>
+        </p:txBody>
+      </p:sp>
+      <p:sp>
+        <p:nvSpPr>
+          <p:cNvPr id="2" name="Slide Number Placeholder 1"/>
+          <p:cNvSpPr>
+            <a:spLocks noGrp="1"/>
+          </p:cNvSpPr>
+          <p:nvPr>
+            <p:ph type="sldNum" sz="quarter" idx="12"/>
+          </p:nvPr>
+        </p:nvSpPr>
+        <p:spPr/>
+        <p:txBody>
+          <a:bodyPr>
+            <a:normAutofit lnSpcReduction="10000"/>
+          </a:bodyPr>
+          <a:lstStyle/>
+          <a:p>
+            <a:fld id="{4FAB73BC-B049-4115-A692-8D63A059BFB8}" type="slidenum">
+              <a:rPr lang="en-US" smtClean="0"/>
+              <a:t>8</a:t>
+            </a:fld>
+            <a:endParaRPr lang="en-US" dirty="0"/>
           </a:p>
         </p:txBody>
       </p:sp>
@@ -6584,10 +6730,9 @@
           <a:lstStyle/>
           <a:p>
             <a:r>
-              <a:rPr lang="en-US" dirty="0" smtClean="0"/>
+              <a:rPr lang="en-US" dirty="0"/>
               <a:t>Interface vs Implementation</a:t>
             </a:r>
-            <a:endParaRPr lang="en-US" dirty="0"/>
           </a:p>
         </p:txBody>
       </p:sp>
@@ -6631,15 +6776,7 @@
                 <a:ea typeface="Consolas" charset="0"/>
                 <a:cs typeface="Consolas" charset="0"/>
               </a:rPr>
-              <a:t>class Dog </a:t>
-            </a:r>
-            <a:r>
-              <a:rPr lang="en-US" sz="2000" dirty="0" smtClean="0">
-                <a:latin typeface="Consolas" charset="0"/>
-                <a:ea typeface="Consolas" charset="0"/>
-                <a:cs typeface="Consolas" charset="0"/>
-              </a:rPr>
-              <a:t>{</a:t>
+              <a:t>class Dog {</a:t>
             </a:r>
           </a:p>
           <a:p>
@@ -6661,26 +6798,7 @@
                 <a:ea typeface="Consolas" charset="0"/>
                 <a:cs typeface="Consolas" charset="0"/>
               </a:rPr>
-              <a:t> </a:t>
-            </a:r>
-            <a:r>
-              <a:rPr lang="en-US" sz="2000" dirty="0" smtClean="0">
-                <a:latin typeface="Consolas" charset="0"/>
-                <a:ea typeface="Consolas" charset="0"/>
-                <a:cs typeface="Consolas" charset="0"/>
-              </a:rPr>
-              <a:t>   </a:t>
-            </a:r>
-            <a:r>
-              <a:rPr lang="en-US" sz="2000" dirty="0" smtClean="0">
-                <a:solidFill>
-                  <a:srgbClr val="FF0000"/>
-                </a:solidFill>
-                <a:latin typeface="Consolas" charset="0"/>
-                <a:ea typeface="Consolas" charset="0"/>
-                <a:cs typeface="Consolas" charset="0"/>
-              </a:rPr>
-              <a:t>private </a:t>
+              <a:t>    </a:t>
             </a:r>
             <a:r>
               <a:rPr lang="en-US" sz="2000" dirty="0">
@@ -6691,16 +6809,8 @@
                 <a:ea typeface="Consolas" charset="0"/>
                 <a:cs typeface="Consolas" charset="0"/>
               </a:rPr>
-              <a:t>String breed;    </a:t>
-            </a:r>
-            <a:endParaRPr lang="en-US" sz="2000" dirty="0" smtClean="0">
-              <a:solidFill>
-                <a:srgbClr val="FF0000"/>
-              </a:solidFill>
-              <a:latin typeface="Consolas" charset="0"/>
-              <a:ea typeface="Consolas" charset="0"/>
-              <a:cs typeface="Consolas" charset="0"/>
-            </a:endParaRPr>
+              <a:t>private String breed;    </a:t>
+            </a:r>
           </a:p>
           <a:p>
             <a:pPr marL="0" indent="0">
@@ -6724,21 +6834,10 @@
                 <a:ea typeface="Consolas" charset="0"/>
                 <a:cs typeface="Consolas" charset="0"/>
               </a:rPr>
-              <a:t> </a:t>
-            </a:r>
-            <a:r>
-              <a:rPr lang="en-US" sz="2000" dirty="0" smtClean="0">
-                <a:solidFill>
-                  <a:srgbClr val="FF0000"/>
-                </a:solidFill>
-                <a:latin typeface="Consolas" charset="0"/>
-                <a:ea typeface="Consolas" charset="0"/>
-                <a:cs typeface="Consolas" charset="0"/>
-              </a:rPr>
-              <a:t>   private </a:t>
-            </a:r>
-            <a:r>
-              <a:rPr lang="en-US" sz="2000" dirty="0" err="1" smtClean="0">
+              <a:t>    private </a:t>
+            </a:r>
+            <a:r>
+              <a:rPr lang="en-US" sz="2000" dirty="0" err="1">
                 <a:solidFill>
                   <a:srgbClr val="FF0000"/>
                 </a:solidFill>
@@ -6749,7 +6848,7 @@
               <a:t>int</a:t>
             </a:r>
             <a:r>
-              <a:rPr lang="en-US" sz="2000" dirty="0" smtClean="0">
+              <a:rPr lang="en-US" sz="2000" dirty="0">
                 <a:solidFill>
                   <a:srgbClr val="FF0000"/>
                 </a:solidFill>
@@ -6759,14 +6858,6 @@
               </a:rPr>
               <a:t> age;</a:t>
             </a:r>
-            <a:endParaRPr lang="en-US" sz="2000" dirty="0">
-              <a:solidFill>
-                <a:srgbClr val="FF0000"/>
-              </a:solidFill>
-              <a:latin typeface="Consolas" charset="0"/>
-              <a:ea typeface="Consolas" charset="0"/>
-              <a:cs typeface="Consolas" charset="0"/>
-            </a:endParaRPr>
           </a:p>
           <a:p>
             <a:pPr marL="0" indent="0">
@@ -6781,7 +6872,7 @@
               </a:spcAft>
               <a:buNone/>
             </a:pPr>
-            <a:endParaRPr lang="en-US" sz="2000" dirty="0" smtClean="0">
+            <a:endParaRPr lang="en-US" sz="2000" dirty="0">
               <a:latin typeface="Consolas" charset="0"/>
               <a:ea typeface="Consolas" charset="0"/>
               <a:cs typeface="Consolas" charset="0"/>
@@ -6806,18 +6897,10 @@
                 <a:ea typeface="Consolas" charset="0"/>
                 <a:cs typeface="Consolas" charset="0"/>
               </a:rPr>
-              <a:t> </a:t>
-            </a:r>
-            <a:r>
-              <a:rPr lang="en-US" sz="2000" dirty="0" smtClean="0">
-                <a:latin typeface="Consolas" charset="0"/>
-                <a:ea typeface="Consolas" charset="0"/>
-                <a:cs typeface="Consolas" charset="0"/>
-              </a:rPr>
-              <a:t>   </a:t>
-            </a:r>
-            <a:r>
-              <a:rPr lang="en-US" sz="2000" dirty="0" smtClean="0">
+              <a:t>    </a:t>
+            </a:r>
+            <a:r>
+              <a:rPr lang="en-US" sz="2000" dirty="0">
                 <a:solidFill>
                   <a:srgbClr val="0070C0"/>
                 </a:solidFill>
@@ -6828,7 +6911,7 @@
               <a:t>Dog(String breed, </a:t>
             </a:r>
             <a:r>
-              <a:rPr lang="en-US" sz="2000" dirty="0" err="1" smtClean="0">
+              <a:rPr lang="en-US" sz="2000" dirty="0" err="1">
                 <a:solidFill>
                   <a:srgbClr val="0070C0"/>
                 </a:solidFill>
@@ -6839,7 +6922,7 @@
               <a:t>int</a:t>
             </a:r>
             <a:r>
-              <a:rPr lang="en-US" sz="2000" dirty="0" smtClean="0">
+              <a:rPr lang="en-US" sz="2000" dirty="0">
                 <a:solidFill>
                   <a:srgbClr val="0070C0"/>
                 </a:solidFill>
@@ -6850,7 +6933,7 @@
               <a:t> age) </a:t>
             </a:r>
             <a:r>
-              <a:rPr lang="en-US" sz="2000" dirty="0" smtClean="0">
+              <a:rPr lang="en-US" sz="2000" dirty="0">
                 <a:latin typeface="Consolas" charset="0"/>
                 <a:ea typeface="Consolas" charset="0"/>
                 <a:cs typeface="Consolas" charset="0"/>
@@ -6872,7 +6955,7 @@
               <a:buNone/>
             </a:pPr>
             <a:r>
-              <a:rPr lang="en-US" sz="2000" dirty="0" smtClean="0">
+              <a:rPr lang="en-US" sz="2000" dirty="0">
                 <a:latin typeface="Consolas" charset="0"/>
                 <a:ea typeface="Consolas" charset="0"/>
                 <a:cs typeface="Consolas" charset="0"/>
@@ -6880,7 +6963,7 @@
               <a:t>        </a:t>
             </a:r>
             <a:r>
-              <a:rPr lang="en-US" sz="2000" dirty="0" err="1" smtClean="0">
+              <a:rPr lang="en-US" sz="2000" dirty="0" err="1">
                 <a:solidFill>
                   <a:srgbClr val="FF0000"/>
                 </a:solidFill>
@@ -6891,17 +6974,6 @@
               <a:t>this.breed</a:t>
             </a:r>
             <a:r>
-              <a:rPr lang="en-US" sz="2000" dirty="0" smtClean="0">
-                <a:solidFill>
-                  <a:srgbClr val="FF0000"/>
-                </a:solidFill>
-                <a:latin typeface="Consolas" charset="0"/>
-                <a:ea typeface="Consolas" charset="0"/>
-                <a:cs typeface="Consolas" charset="0"/>
-              </a:rPr>
-              <a:t> </a:t>
-            </a:r>
-            <a:r>
               <a:rPr lang="en-US" sz="2000" dirty="0">
                 <a:solidFill>
                   <a:srgbClr val="FF0000"/>
@@ -6910,18 +6982,7 @@
                 <a:ea typeface="Consolas" charset="0"/>
                 <a:cs typeface="Consolas" charset="0"/>
               </a:rPr>
-              <a:t>= breed</a:t>
-            </a:r>
-            <a:r>
-              <a:rPr lang="en-US" sz="2000" dirty="0" smtClean="0">
-                <a:solidFill>
-                  <a:srgbClr val="FF0000"/>
-                </a:solidFill>
-                <a:latin typeface="Consolas" charset="0"/>
-                <a:ea typeface="Consolas" charset="0"/>
-                <a:cs typeface="Consolas" charset="0"/>
-              </a:rPr>
-              <a:t>;</a:t>
+              <a:t> = breed;</a:t>
             </a:r>
           </a:p>
           <a:p>
@@ -6946,21 +7007,10 @@
                 <a:ea typeface="Consolas" charset="0"/>
                 <a:cs typeface="Consolas" charset="0"/>
               </a:rPr>
-              <a:t> </a:t>
-            </a:r>
-            <a:r>
-              <a:rPr lang="en-US" sz="2000" dirty="0" smtClean="0">
-                <a:solidFill>
-                  <a:srgbClr val="FF0000"/>
-                </a:solidFill>
-                <a:latin typeface="Consolas" charset="0"/>
-                <a:ea typeface="Consolas" charset="0"/>
-                <a:cs typeface="Consolas" charset="0"/>
-              </a:rPr>
-              <a:t>       </a:t>
-            </a:r>
-            <a:r>
-              <a:rPr lang="en-US" sz="2000" dirty="0" err="1" smtClean="0">
+              <a:t>        </a:t>
+            </a:r>
+            <a:r>
+              <a:rPr lang="en-US" sz="2000" dirty="0" err="1">
                 <a:solidFill>
                   <a:srgbClr val="FF0000"/>
                 </a:solidFill>
@@ -6971,7 +7021,7 @@
               <a:t>this.age</a:t>
             </a:r>
             <a:r>
-              <a:rPr lang="en-US" sz="2000" dirty="0" smtClean="0">
+              <a:rPr lang="en-US" sz="2000" dirty="0">
                 <a:solidFill>
                   <a:srgbClr val="FF0000"/>
                 </a:solidFill>
@@ -7001,15 +7051,7 @@
                 <a:ea typeface="Consolas" charset="0"/>
                 <a:cs typeface="Consolas" charset="0"/>
               </a:rPr>
-              <a:t> </a:t>
-            </a:r>
-            <a:r>
-              <a:rPr lang="en-US" sz="2000" dirty="0" smtClean="0">
-                <a:latin typeface="Consolas" charset="0"/>
-                <a:ea typeface="Consolas" charset="0"/>
-                <a:cs typeface="Consolas" charset="0"/>
-              </a:rPr>
-              <a:t>   }</a:t>
+              <a:t>    }</a:t>
             </a:r>
           </a:p>
           <a:p>
@@ -7045,23 +7087,12 @@
               <a:buNone/>
             </a:pPr>
             <a:r>
-              <a:rPr lang="en-US" sz="2000" dirty="0" smtClean="0">
+              <a:rPr lang="en-US" sz="2000" dirty="0">
                 <a:latin typeface="Consolas" charset="0"/>
                 <a:ea typeface="Consolas" charset="0"/>
                 <a:cs typeface="Consolas" charset="0"/>
               </a:rPr>
               <a:t>    </a:t>
-            </a:r>
-            <a:r>
-              <a:rPr lang="en-US" sz="2000" dirty="0" smtClean="0">
-                <a:solidFill>
-                  <a:srgbClr val="0070C0"/>
-                </a:solidFill>
-                <a:latin typeface="Consolas" charset="0"/>
-                <a:ea typeface="Consolas" charset="0"/>
-                <a:cs typeface="Consolas" charset="0"/>
-              </a:rPr>
-              <a:t>public </a:t>
             </a:r>
             <a:r>
               <a:rPr lang="en-US" sz="2000" dirty="0">
@@ -7072,7 +7103,7 @@
                 <a:ea typeface="Consolas" charset="0"/>
                 <a:cs typeface="Consolas" charset="0"/>
               </a:rPr>
-              <a:t>void speak() </a:t>
+              <a:t>public void speak() </a:t>
             </a:r>
             <a:r>
               <a:rPr lang="en-US" sz="2000" dirty="0">
@@ -7080,15 +7111,7 @@
                 <a:ea typeface="Consolas" charset="0"/>
                 <a:cs typeface="Consolas" charset="0"/>
               </a:rPr>
-              <a:t>{        </a:t>
-            </a:r>
-            <a:r>
-              <a:rPr lang="en-US" sz="2000" dirty="0" smtClean="0">
-                <a:latin typeface="Consolas" charset="0"/>
-                <a:ea typeface="Consolas" charset="0"/>
-                <a:cs typeface="Consolas" charset="0"/>
-              </a:rPr>
-              <a:t> </a:t>
+              <a:t>{         </a:t>
             </a:r>
           </a:p>
           <a:p>
@@ -7110,18 +7133,10 @@
                 <a:ea typeface="Consolas" charset="0"/>
                 <a:cs typeface="Consolas" charset="0"/>
               </a:rPr>
-              <a:t> </a:t>
-            </a:r>
-            <a:r>
-              <a:rPr lang="en-US" sz="2000" dirty="0" smtClean="0">
-                <a:latin typeface="Consolas" charset="0"/>
-                <a:ea typeface="Consolas" charset="0"/>
-                <a:cs typeface="Consolas" charset="0"/>
-              </a:rPr>
-              <a:t>       </a:t>
-            </a:r>
-            <a:r>
-              <a:rPr lang="en-US" sz="2000" dirty="0" err="1" smtClean="0">
+              <a:t>        </a:t>
+            </a:r>
+            <a:r>
+              <a:rPr lang="en-US" sz="2000" dirty="0" err="1">
                 <a:solidFill>
                   <a:srgbClr val="FF0000"/>
                 </a:solidFill>
@@ -7150,11 +7165,6 @@
               </a:rPr>
               <a:t>    </a:t>
             </a:r>
-            <a:endParaRPr lang="en-US" sz="2000" dirty="0" smtClean="0">
-              <a:latin typeface="Consolas" charset="0"/>
-              <a:ea typeface="Consolas" charset="0"/>
-              <a:cs typeface="Consolas" charset="0"/>
-            </a:endParaRPr>
           </a:p>
           <a:p>
             <a:pPr marL="0" indent="0">
@@ -7175,15 +7185,7 @@
                 <a:ea typeface="Consolas" charset="0"/>
                 <a:cs typeface="Consolas" charset="0"/>
               </a:rPr>
-              <a:t> </a:t>
-            </a:r>
-            <a:r>
-              <a:rPr lang="en-US" sz="2000" dirty="0" smtClean="0">
-                <a:latin typeface="Consolas" charset="0"/>
-                <a:ea typeface="Consolas" charset="0"/>
-                <a:cs typeface="Consolas" charset="0"/>
-              </a:rPr>
-              <a:t>   }</a:t>
+              <a:t>    }</a:t>
             </a:r>
           </a:p>
           <a:p>
@@ -7200,7 +7202,7 @@
               <a:buNone/>
             </a:pPr>
             <a:r>
-              <a:rPr lang="en-US" sz="2000" dirty="0" smtClean="0">
+              <a:rPr lang="en-US" sz="2000" dirty="0">
                 <a:latin typeface="Consolas" charset="0"/>
                 <a:ea typeface="Consolas" charset="0"/>
                 <a:cs typeface="Consolas" charset="0"/>
@@ -7233,18 +7235,13 @@
           <a:lstStyle/>
           <a:p>
             <a:r>
-              <a:rPr lang="en-US" sz="2800" b="1" dirty="0" smtClean="0">
+              <a:rPr lang="en-US" sz="2800" b="1" dirty="0">
                 <a:solidFill>
                   <a:srgbClr val="0070C0"/>
                 </a:solidFill>
               </a:rPr>
               <a:t>Interface</a:t>
             </a:r>
-            <a:endParaRPr lang="en-US" sz="2800" b="1" dirty="0">
-              <a:solidFill>
-                <a:srgbClr val="0070C0"/>
-              </a:solidFill>
-            </a:endParaRPr>
           </a:p>
         </p:txBody>
       </p:sp>
@@ -7271,18 +7268,13 @@
           <a:lstStyle/>
           <a:p>
             <a:r>
-              <a:rPr lang="en-US" sz="2800" b="1" dirty="0" smtClean="0">
+              <a:rPr lang="en-US" sz="2800" b="1" dirty="0">
                 <a:solidFill>
                   <a:srgbClr val="FF0000"/>
                 </a:solidFill>
               </a:rPr>
               <a:t>Implementation</a:t>
             </a:r>
-            <a:endParaRPr lang="en-US" sz="2800" b="1" dirty="0">
-              <a:solidFill>
-                <a:srgbClr val="FF0000"/>
-              </a:solidFill>
-            </a:endParaRPr>
           </a:p>
         </p:txBody>
       </p:sp>
@@ -7476,6 +7468,31 @@
           </a:fontRef>
         </p:style>
       </p:cxnSp>
+      <p:sp>
+        <p:nvSpPr>
+          <p:cNvPr id="6" name="Slide Number Placeholder 5"/>
+          <p:cNvSpPr>
+            <a:spLocks noGrp="1"/>
+          </p:cNvSpPr>
+          <p:nvPr>
+            <p:ph type="sldNum" sz="quarter" idx="12"/>
+          </p:nvPr>
+        </p:nvSpPr>
+        <p:spPr/>
+        <p:txBody>
+          <a:bodyPr>
+            <a:normAutofit lnSpcReduction="10000"/>
+          </a:bodyPr>
+          <a:lstStyle/>
+          <a:p>
+            <a:fld id="{4FAB73BC-B049-4115-A692-8D63A059BFB8}" type="slidenum">
+              <a:rPr lang="en-US" smtClean="0"/>
+              <a:t>9</a:t>
+            </a:fld>
+            <a:endParaRPr lang="en-US" dirty="0"/>
+          </a:p>
+        </p:txBody>
+      </p:sp>
     </p:spTree>
     <p:extLst>
       <p:ext uri="{BB962C8B-B14F-4D97-AF65-F5344CB8AC3E}">

</xml_diff>